<commit_message>
All powerpoints were updated for the Fall 2022 class
</commit_message>
<xml_diff>
--- a/Week 02 - git.pptx
+++ b/Week 02 - git.pptx
@@ -5,39 +5,40 @@
     <p:sldMasterId id="2147483648" r:id="rId1"/>
   </p:sldMasterIdLst>
   <p:notesMasterIdLst>
-    <p:notesMasterId r:id="rId32"/>
+    <p:notesMasterId r:id="rId33"/>
   </p:notesMasterIdLst>
   <p:sldIdLst>
     <p:sldId id="256" r:id="rId2"/>
     <p:sldId id="274" r:id="rId3"/>
     <p:sldId id="257" r:id="rId4"/>
     <p:sldId id="266" r:id="rId5"/>
-    <p:sldId id="260" r:id="rId6"/>
-    <p:sldId id="261" r:id="rId7"/>
-    <p:sldId id="262" r:id="rId8"/>
-    <p:sldId id="264" r:id="rId9"/>
-    <p:sldId id="270" r:id="rId10"/>
-    <p:sldId id="293" r:id="rId11"/>
-    <p:sldId id="265" r:id="rId12"/>
-    <p:sldId id="271" r:id="rId13"/>
-    <p:sldId id="272" r:id="rId14"/>
-    <p:sldId id="273" r:id="rId15"/>
-    <p:sldId id="275" r:id="rId16"/>
-    <p:sldId id="276" r:id="rId17"/>
-    <p:sldId id="277" r:id="rId18"/>
-    <p:sldId id="278" r:id="rId19"/>
-    <p:sldId id="292" r:id="rId20"/>
-    <p:sldId id="288" r:id="rId21"/>
-    <p:sldId id="290" r:id="rId22"/>
-    <p:sldId id="291" r:id="rId23"/>
-    <p:sldId id="279" r:id="rId24"/>
-    <p:sldId id="282" r:id="rId25"/>
-    <p:sldId id="280" r:id="rId26"/>
-    <p:sldId id="287" r:id="rId27"/>
-    <p:sldId id="281" r:id="rId28"/>
-    <p:sldId id="284" r:id="rId29"/>
-    <p:sldId id="285" r:id="rId30"/>
-    <p:sldId id="286" r:id="rId31"/>
+    <p:sldId id="294" r:id="rId6"/>
+    <p:sldId id="260" r:id="rId7"/>
+    <p:sldId id="261" r:id="rId8"/>
+    <p:sldId id="262" r:id="rId9"/>
+    <p:sldId id="264" r:id="rId10"/>
+    <p:sldId id="270" r:id="rId11"/>
+    <p:sldId id="293" r:id="rId12"/>
+    <p:sldId id="265" r:id="rId13"/>
+    <p:sldId id="271" r:id="rId14"/>
+    <p:sldId id="272" r:id="rId15"/>
+    <p:sldId id="273" r:id="rId16"/>
+    <p:sldId id="275" r:id="rId17"/>
+    <p:sldId id="276" r:id="rId18"/>
+    <p:sldId id="277" r:id="rId19"/>
+    <p:sldId id="278" r:id="rId20"/>
+    <p:sldId id="292" r:id="rId21"/>
+    <p:sldId id="288" r:id="rId22"/>
+    <p:sldId id="290" r:id="rId23"/>
+    <p:sldId id="291" r:id="rId24"/>
+    <p:sldId id="279" r:id="rId25"/>
+    <p:sldId id="282" r:id="rId26"/>
+    <p:sldId id="280" r:id="rId27"/>
+    <p:sldId id="287" r:id="rId28"/>
+    <p:sldId id="281" r:id="rId29"/>
+    <p:sldId id="284" r:id="rId30"/>
+    <p:sldId id="285" r:id="rId31"/>
+    <p:sldId id="286" r:id="rId32"/>
   </p:sldIdLst>
   <p:sldSz cx="12192000" cy="6858000"/>
   <p:notesSz cx="6858000" cy="9144000"/>
@@ -234,7 +235,7 @@
           <a:p>
             <a:fld id="{0598D9CF-EA6B-724A-9C03-620689487A2C}" type="datetimeFigureOut">
               <a:rPr lang="en-US" smtClean="0"/>
-              <a:t>1/31/22</a:t>
+              <a:t>7/30/22</a:t>
             </a:fld>
             <a:endParaRPr lang="en-US"/>
           </a:p>
@@ -566,7 +567,7 @@
           <a:p>
             <a:fld id="{7232280E-53F8-F348-9574-F1E735076B89}" type="slidenum">
               <a:rPr lang="en-US" smtClean="0"/>
-              <a:t>18</a:t>
+              <a:t>19</a:t>
             </a:fld>
             <a:endParaRPr lang="en-US"/>
           </a:p>
@@ -802,7 +803,7 @@
           <a:p>
             <a:fld id="{9AB3A824-1A51-4B26-AD58-A6D8E14F6C04}" type="datetimeFigureOut">
               <a:rPr lang="en-US" dirty="0"/>
-              <a:t>1/31/22</a:t>
+              <a:t>7/30/22</a:t>
             </a:fld>
             <a:endParaRPr lang="en-US" dirty="0"/>
           </a:p>
@@ -1136,7 +1137,7 @@
           <a:p>
             <a:fld id="{D857E33E-8B18-4087-B112-809917729534}" type="datetimeFigureOut">
               <a:rPr lang="en-US" dirty="0"/>
-              <a:t>1/31/22</a:t>
+              <a:t>7/30/22</a:t>
             </a:fld>
             <a:endParaRPr lang="en-US" dirty="0"/>
           </a:p>
@@ -1438,7 +1439,7 @@
           <a:p>
             <a:fld id="{D3FFE419-2371-464F-8239-3959401C3561}" type="datetimeFigureOut">
               <a:rPr lang="en-US" dirty="0"/>
-              <a:t>1/31/22</a:t>
+              <a:t>7/30/22</a:t>
             </a:fld>
             <a:endParaRPr lang="en-US" dirty="0"/>
           </a:p>
@@ -1685,7 +1686,7 @@
           <a:p>
             <a:fld id="{97D162C4-EDD9-4389-A98B-B87ECEA2A816}" type="datetimeFigureOut">
               <a:rPr lang="en-US" dirty="0"/>
-              <a:t>1/31/22</a:t>
+              <a:t>7/30/22</a:t>
             </a:fld>
             <a:endParaRPr lang="en-US" dirty="0"/>
           </a:p>
@@ -2092,7 +2093,7 @@
           <a:p>
             <a:fld id="{3E5059C3-6A89-4494-99FF-5A4D6FFD50EB}" type="datetimeFigureOut">
               <a:rPr lang="en-US" dirty="0"/>
-              <a:t>1/31/22</a:t>
+              <a:t>7/30/22</a:t>
             </a:fld>
             <a:endParaRPr lang="en-US" dirty="0"/>
           </a:p>
@@ -2406,7 +2407,7 @@
           <a:p>
             <a:fld id="{CA954B2F-12DE-47F5-8894-472B206D2E1E}" type="datetimeFigureOut">
               <a:rPr lang="en-US" dirty="0"/>
-              <a:t>1/31/22</a:t>
+              <a:t>7/30/22</a:t>
             </a:fld>
             <a:endParaRPr lang="en-US" dirty="0"/>
           </a:p>
@@ -2950,7 +2951,7 @@
           <a:p>
             <a:fld id="{3F30E46F-7819-4ACF-B48B-48222C2ACC88}" type="datetimeFigureOut">
               <a:rPr lang="en-US" dirty="0"/>
-              <a:t>1/31/22</a:t>
+              <a:t>7/30/22</a:t>
             </a:fld>
             <a:endParaRPr lang="en-US" dirty="0"/>
           </a:p>
@@ -3145,7 +3146,7 @@
           <a:p>
             <a:fld id="{1FAF3416-4057-4DAA-829D-4CA07428D088}" type="datetimeFigureOut">
               <a:rPr lang="en-US" dirty="0"/>
-              <a:t>1/31/22</a:t>
+              <a:t>7/30/22</a:t>
             </a:fld>
             <a:endParaRPr lang="en-US" dirty="0"/>
           </a:p>
@@ -3358,7 +3359,7 @@
           <a:p>
             <a:fld id="{921D9284-D300-4297-87F7-E791DCC15DB1}" type="datetimeFigureOut">
               <a:rPr lang="en-US" dirty="0"/>
-              <a:t>1/31/22</a:t>
+              <a:t>7/30/22</a:t>
             </a:fld>
             <a:endParaRPr lang="en-US" dirty="0"/>
           </a:p>
@@ -3727,7 +3728,7 @@
           <a:p>
             <a:fld id="{37D525BB-DA17-4BA0-B3C8-3AC3ABC827E6}" type="datetimeFigureOut">
               <a:rPr lang="en-US" dirty="0"/>
-              <a:t>1/31/22</a:t>
+              <a:t>7/30/22</a:t>
             </a:fld>
             <a:endParaRPr lang="en-US" dirty="0"/>
           </a:p>
@@ -4130,7 +4131,7 @@
           <a:p>
             <a:fld id="{B16C4C9A-3960-41CF-A4E9-2A8FB932454B}" type="datetimeFigureOut">
               <a:rPr lang="en-US" dirty="0"/>
-              <a:t>1/31/22</a:t>
+              <a:t>7/30/22</a:t>
             </a:fld>
             <a:endParaRPr lang="en-US" dirty="0"/>
           </a:p>
@@ -4441,7 +4442,7 @@
           <a:p>
             <a:fld id="{3CBC1C18-307B-4F68-A007-B5B542270E8D}" type="datetimeFigureOut">
               <a:rPr lang="en-US" dirty="0"/>
-              <a:t>1/31/22</a:t>
+              <a:t>7/30/22</a:t>
             </a:fld>
             <a:endParaRPr lang="en-US" dirty="0"/>
           </a:p>
@@ -5049,7 +5050,7 @@
           <p:cNvPr id="2" name="Title 1">
             <a:extLst>
               <a:ext uri="{FF2B5EF4-FFF2-40B4-BE49-F238E27FC236}">
-                <a16:creationId xmlns:a16="http://schemas.microsoft.com/office/drawing/2014/main" id="{40150F54-A300-2044-85AE-BC8E2ECA4046}"/>
+                <a16:creationId xmlns:a16="http://schemas.microsoft.com/office/drawing/2014/main" id="{804CC23C-B918-2C40-99F1-D640E26113DF}"/>
               </a:ext>
             </a:extLst>
           </p:cNvPr>
@@ -5062,12 +5063,14 @@
         </p:nvSpPr>
         <p:spPr/>
         <p:txBody>
-          <a:bodyPr/>
-          <a:lstStyle/>
-          <a:p>
-            <a:r>
-              <a:rPr lang="en-US" dirty="0"/>
-              <a:t>What is GitHub pull request?</a:t>
+          <a:bodyPr>
+            <a:normAutofit fontScale="90000"/>
+          </a:bodyPr>
+          <a:lstStyle/>
+          <a:p>
+            <a:r>
+              <a:rPr lang="en-US" dirty="0"/>
+              <a:t>Ensure you're working from latest version</a:t>
             </a:r>
             <a:br>
               <a:rPr lang="en-US" dirty="0"/>
@@ -5081,7 +5084,7 @@
           <p:cNvPr id="3" name="Content Placeholder 2">
             <a:extLst>
               <a:ext uri="{FF2B5EF4-FFF2-40B4-BE49-F238E27FC236}">
-                <a16:creationId xmlns:a16="http://schemas.microsoft.com/office/drawing/2014/main" id="{44DF44D1-96A5-714E-8C06-815B5E8557F8}"/>
+                <a16:creationId xmlns:a16="http://schemas.microsoft.com/office/drawing/2014/main" id="{8B5E3C1F-87F7-934A-ABB0-E378A379DD79}"/>
               </a:ext>
             </a:extLst>
           </p:cNvPr>
@@ -5092,28 +5095,106 @@
             <p:ph idx="1"/>
           </p:nvPr>
         </p:nvSpPr>
-        <p:spPr/>
-        <p:txBody>
-          <a:bodyPr/>
-          <a:lstStyle/>
-          <a:p>
-            <a:r>
-              <a:rPr lang="en-US" dirty="0"/>
-              <a:t>Pull request is a process for a developer to notify team members that they have completed a feature. Once their feature branch is ready, the developer files a pull request via their remote server account. </a:t>
-            </a:r>
-          </a:p>
-          <a:p>
-            <a:r>
-              <a:rPr lang="en-US" dirty="0"/>
-              <a:t>The pull request announces to all the team members that they need to review the code and merge it into the master branch.</a:t>
-            </a:r>
+        <p:spPr>
+          <a:xfrm>
+            <a:off x="2773599" y="2052116"/>
+            <a:ext cx="7796540" cy="3997828"/>
+          </a:xfrm>
+        </p:spPr>
+        <p:txBody>
+          <a:bodyPr>
+            <a:normAutofit/>
+          </a:bodyPr>
+          <a:lstStyle/>
+          <a:p>
+            <a:pPr marL="342900" lvl="0" indent="-342900">
+              <a:spcBef>
+                <a:spcPts val="0"/>
+              </a:spcBef>
+            </a:pPr>
+            <a:r>
+              <a:rPr lang="en-US" dirty="0"/>
+              <a:t>It’s easy to have a local copy of the codebase if you fall behind the global copy. Make sure to </a:t>
+            </a:r>
+            <a:r>
+              <a:rPr lang="en-US" dirty="0">
+                <a:solidFill>
+                  <a:srgbClr val="FF0000"/>
+                </a:solidFill>
+                <a:hlinkClick r:id="rId2">
+                  <a:extLst>
+                    <a:ext uri="{A12FA001-AC4F-418D-AE19-62706E023703}">
+                      <ahyp:hlinkClr xmlns:ahyp="http://schemas.microsoft.com/office/drawing/2018/hyperlinkcolor" val="tx"/>
+                    </a:ext>
+                  </a:extLst>
+                </a:hlinkClick>
+              </a:rPr>
+              <a:t>git pull</a:t>
+            </a:r>
+            <a:r>
+              <a:rPr lang="en-US" dirty="0">
+                <a:solidFill>
+                  <a:srgbClr val="FF0000"/>
+                </a:solidFill>
+              </a:rPr>
+              <a:t> </a:t>
+            </a:r>
+            <a:r>
+              <a:rPr lang="en-US" dirty="0"/>
+              <a:t>or </a:t>
+            </a:r>
+            <a:r>
+              <a:rPr lang="en-US" dirty="0">
+                <a:solidFill>
+                  <a:srgbClr val="FF0000"/>
+                </a:solidFill>
+              </a:rPr>
+              <a:t>fetch</a:t>
+            </a:r>
+            <a:r>
+              <a:rPr lang="en-US" dirty="0"/>
+              <a:t> the latest code before making updates. This will help avoid conflicts at merge time.</a:t>
+            </a:r>
+          </a:p>
+          <a:p>
+            <a:pPr marL="342900" lvl="0" indent="-342900">
+              <a:spcBef>
+                <a:spcPts val="0"/>
+              </a:spcBef>
+            </a:pPr>
+            <a:endParaRPr lang="en-US" dirty="0"/>
+          </a:p>
+          <a:p>
+            <a:pPr marL="342900" lvl="0" indent="-342900">
+              <a:spcBef>
+                <a:spcPts val="0"/>
+              </a:spcBef>
+            </a:pPr>
+            <a:r>
+              <a:rPr lang="en-US" dirty="0"/>
+              <a:t>Fetch – gets current copy of repo</a:t>
+            </a:r>
+          </a:p>
+          <a:p>
+            <a:pPr marL="342900" lvl="0" indent="-342900">
+              <a:spcBef>
+                <a:spcPts val="0"/>
+              </a:spcBef>
+            </a:pPr>
+            <a:r>
+              <a:rPr lang="en-US" dirty="0"/>
+              <a:t>Pull – a fetch PLUS  a merge. You have the opportunity to update your code base with your changes and the team’s changes.</a:t>
+            </a:r>
+          </a:p>
+          <a:p>
+            <a:endParaRPr lang="en-US" dirty="0"/>
           </a:p>
         </p:txBody>
       </p:sp>
     </p:spTree>
     <p:extLst>
       <p:ext uri="{BB962C8B-B14F-4D97-AF65-F5344CB8AC3E}">
-        <p14:creationId xmlns:p14="http://schemas.microsoft.com/office/powerpoint/2010/main" val="556347104"/>
+        <p14:creationId xmlns:p14="http://schemas.microsoft.com/office/powerpoint/2010/main" val="4005328607"/>
       </p:ext>
     </p:extLst>
   </p:cSld>
@@ -5145,7 +5226,7 @@
           <p:cNvPr id="2" name="Title 1">
             <a:extLst>
               <a:ext uri="{FF2B5EF4-FFF2-40B4-BE49-F238E27FC236}">
-                <a16:creationId xmlns:a16="http://schemas.microsoft.com/office/drawing/2014/main" id="{4C5CE982-66A9-A04E-8E71-A0EC5903B28D}"/>
+                <a16:creationId xmlns:a16="http://schemas.microsoft.com/office/drawing/2014/main" id="{40150F54-A300-2044-85AE-BC8E2ECA4046}"/>
               </a:ext>
             </a:extLst>
           </p:cNvPr>
@@ -5162,8 +5243,8 @@
           <a:lstStyle/>
           <a:p>
             <a:r>
-              <a:rPr lang="en-US" b="1" dirty="0"/>
-              <a:t>Make detailed notes</a:t>
+              <a:rPr lang="en-US" dirty="0"/>
+              <a:t>What is GitHub pull request?</a:t>
             </a:r>
             <a:br>
               <a:rPr lang="en-US" dirty="0"/>
@@ -5177,7 +5258,7 @@
           <p:cNvPr id="3" name="Content Placeholder 2">
             <a:extLst>
               <a:ext uri="{FF2B5EF4-FFF2-40B4-BE49-F238E27FC236}">
-                <a16:creationId xmlns:a16="http://schemas.microsoft.com/office/drawing/2014/main" id="{D38C6B62-63D1-3245-921F-A7FD2A90B910}"/>
+                <a16:creationId xmlns:a16="http://schemas.microsoft.com/office/drawing/2014/main" id="{44DF44D1-96A5-714E-8C06-815B5E8557F8}"/>
               </a:ext>
             </a:extLst>
           </p:cNvPr>
@@ -5188,54 +5269,28 @@
             <p:ph idx="1"/>
           </p:nvPr>
         </p:nvSpPr>
-        <p:spPr>
-          <a:xfrm>
-            <a:off x="2773599" y="2052116"/>
-            <a:ext cx="7796540" cy="4291534"/>
-          </a:xfrm>
-        </p:spPr>
-        <p:txBody>
-          <a:bodyPr>
-            <a:normAutofit/>
-          </a:bodyPr>
-          <a:lstStyle/>
-          <a:p>
-            <a:pPr lvl="0"/>
-            <a:r>
-              <a:rPr lang="en-US" dirty="0"/>
-              <a:t>Each commit has a corresponding log entry. </a:t>
-            </a:r>
-          </a:p>
-          <a:p>
-            <a:pPr lvl="0"/>
-            <a:r>
-              <a:rPr lang="en-US" dirty="0"/>
-              <a:t>At the time of commit creation, this log entry is populated with a message. </a:t>
-            </a:r>
-          </a:p>
-          <a:p>
-            <a:pPr lvl="0"/>
-            <a:r>
-              <a:rPr lang="en-US" dirty="0"/>
-              <a:t>It is important to leave descriptive explanatory commit log messages. These commit log messages should explain the “why” and “what” that encompass the commits content. </a:t>
-            </a:r>
-          </a:p>
-          <a:p>
-            <a:pPr lvl="0"/>
-            <a:r>
-              <a:rPr lang="en-US" dirty="0"/>
-              <a:t>These log messages become the canonical history of the project’s development and leave a trail for future contributors to review.</a:t>
-            </a:r>
-          </a:p>
-          <a:p>
-            <a:endParaRPr lang="en-US" dirty="0"/>
+        <p:spPr/>
+        <p:txBody>
+          <a:bodyPr/>
+          <a:lstStyle/>
+          <a:p>
+            <a:r>
+              <a:rPr lang="en-US" dirty="0"/>
+              <a:t>Pull request is a process for a developer to notify team members that they have completed a feature. Once their feature branch is ready, the developer files a pull request via their remote server account. </a:t>
+            </a:r>
+          </a:p>
+          <a:p>
+            <a:r>
+              <a:rPr lang="en-US" dirty="0"/>
+              <a:t>The pull request announces to all the team members that they need to review the code and merge it into the master branch.</a:t>
+            </a:r>
           </a:p>
         </p:txBody>
       </p:sp>
     </p:spTree>
     <p:extLst>
       <p:ext uri="{BB962C8B-B14F-4D97-AF65-F5344CB8AC3E}">
-        <p14:creationId xmlns:p14="http://schemas.microsoft.com/office/powerpoint/2010/main" val="2366418929"/>
+        <p14:creationId xmlns:p14="http://schemas.microsoft.com/office/powerpoint/2010/main" val="556347104"/>
       </p:ext>
     </p:extLst>
   </p:cSld>
@@ -5267,7 +5322,7 @@
           <p:cNvPr id="2" name="Title 1">
             <a:extLst>
               <a:ext uri="{FF2B5EF4-FFF2-40B4-BE49-F238E27FC236}">
-                <a16:creationId xmlns:a16="http://schemas.microsoft.com/office/drawing/2014/main" id="{242FBE9C-133C-C645-BEC9-918F96FA14D4}"/>
+                <a16:creationId xmlns:a16="http://schemas.microsoft.com/office/drawing/2014/main" id="{4C5CE982-66A9-A04E-8E71-A0EC5903B28D}"/>
               </a:ext>
             </a:extLst>
           </p:cNvPr>
@@ -5285,7 +5340,7 @@
           <a:p>
             <a:r>
               <a:rPr lang="en-US" b="1" dirty="0"/>
-              <a:t>Review changes before committing</a:t>
+              <a:t>Make detailed notes</a:t>
             </a:r>
             <a:br>
               <a:rPr lang="en-US" dirty="0"/>
@@ -5299,7 +5354,7 @@
           <p:cNvPr id="3" name="Content Placeholder 2">
             <a:extLst>
               <a:ext uri="{FF2B5EF4-FFF2-40B4-BE49-F238E27FC236}">
-                <a16:creationId xmlns:a16="http://schemas.microsoft.com/office/drawing/2014/main" id="{5953CC02-2076-7E4A-A223-B3644927DC0B}"/>
+                <a16:creationId xmlns:a16="http://schemas.microsoft.com/office/drawing/2014/main" id="{D38C6B62-63D1-3245-921F-A7FD2A90B910}"/>
               </a:ext>
             </a:extLst>
           </p:cNvPr>
@@ -5313,31 +5368,40 @@
         <p:spPr>
           <a:xfrm>
             <a:off x="2773599" y="2052116"/>
-            <a:ext cx="7796540" cy="3159964"/>
+            <a:ext cx="7796540" cy="4291534"/>
           </a:xfrm>
         </p:spPr>
         <p:txBody>
-          <a:bodyPr/>
+          <a:bodyPr>
+            <a:normAutofit/>
+          </a:bodyPr>
           <a:lstStyle/>
           <a:p>
             <a:pPr lvl="0"/>
             <a:r>
               <a:rPr lang="en-US" dirty="0"/>
-              <a:t>The staging area can be used to collect a group of edits before writing them to a commit. </a:t>
+              <a:t>Each commit has a corresponding log entry. </a:t>
             </a:r>
           </a:p>
           <a:p>
             <a:pPr lvl="0"/>
             <a:r>
               <a:rPr lang="en-US" dirty="0"/>
-              <a:t>The staging area can be used to manage and review changes before creating the commit snapshot. </a:t>
+              <a:t>At the time of commit creation, this log entry is populated with a message. </a:t>
             </a:r>
           </a:p>
           <a:p>
             <a:pPr lvl="0"/>
             <a:r>
               <a:rPr lang="en-US" dirty="0"/>
-              <a:t>Utilizing the staging area in this manner provides a buffer area to help refine the contents of the commit.</a:t>
+              <a:t>It is important to leave descriptive explanatory commit log messages. These commit log messages should explain the “why” and “what” that encompass the commits content. </a:t>
+            </a:r>
+          </a:p>
+          <a:p>
+            <a:pPr lvl="0"/>
+            <a:r>
+              <a:rPr lang="en-US" dirty="0"/>
+              <a:t>These log messages become the canonical history of the project’s development and leave a trail for future contributors to review.</a:t>
             </a:r>
           </a:p>
           <a:p>
@@ -5348,7 +5412,7 @@
     </p:spTree>
     <p:extLst>
       <p:ext uri="{BB962C8B-B14F-4D97-AF65-F5344CB8AC3E}">
-        <p14:creationId xmlns:p14="http://schemas.microsoft.com/office/powerpoint/2010/main" val="2105511052"/>
+        <p14:creationId xmlns:p14="http://schemas.microsoft.com/office/powerpoint/2010/main" val="2366418929"/>
       </p:ext>
     </p:extLst>
   </p:cSld>
@@ -5380,7 +5444,7 @@
           <p:cNvPr id="2" name="Title 1">
             <a:extLst>
               <a:ext uri="{FF2B5EF4-FFF2-40B4-BE49-F238E27FC236}">
-                <a16:creationId xmlns:a16="http://schemas.microsoft.com/office/drawing/2014/main" id="{9E3A0FA5-E20D-CF4F-B7FD-8254BB326919}"/>
+                <a16:creationId xmlns:a16="http://schemas.microsoft.com/office/drawing/2014/main" id="{242FBE9C-133C-C645-BEC9-918F96FA14D4}"/>
               </a:ext>
             </a:extLst>
           </p:cNvPr>
@@ -5398,7 +5462,7 @@
           <a:p>
             <a:r>
               <a:rPr lang="en-US" b="1" dirty="0"/>
-              <a:t>Use Branches</a:t>
+              <a:t>Review changes before committing</a:t>
             </a:r>
             <a:br>
               <a:rPr lang="en-US" dirty="0"/>
@@ -5412,7 +5476,7 @@
           <p:cNvPr id="3" name="Content Placeholder 2">
             <a:extLst>
               <a:ext uri="{FF2B5EF4-FFF2-40B4-BE49-F238E27FC236}">
-                <a16:creationId xmlns:a16="http://schemas.microsoft.com/office/drawing/2014/main" id="{6B6880DE-11F8-6549-86E6-D8B3FD5DE7A9}"/>
+                <a16:creationId xmlns:a16="http://schemas.microsoft.com/office/drawing/2014/main" id="{5953CC02-2076-7E4A-A223-B3644927DC0B}"/>
               </a:ext>
             </a:extLst>
           </p:cNvPr>
@@ -5426,40 +5490,31 @@
         <p:spPr>
           <a:xfrm>
             <a:off x="2773599" y="2052116"/>
-            <a:ext cx="7796540" cy="4131514"/>
+            <a:ext cx="7796540" cy="3159964"/>
           </a:xfrm>
         </p:spPr>
         <p:txBody>
-          <a:bodyPr>
-            <a:normAutofit/>
-          </a:bodyPr>
+          <a:bodyPr/>
           <a:lstStyle/>
           <a:p>
             <a:pPr lvl="0"/>
             <a:r>
               <a:rPr lang="en-US" dirty="0"/>
-              <a:t>Branching is a powerful mechanism that allows developers to create a separate line of development. </a:t>
+              <a:t>The staging area can be used to collect a group of edits before writing them to a commit. </a:t>
             </a:r>
           </a:p>
           <a:p>
             <a:pPr lvl="0"/>
             <a:r>
               <a:rPr lang="en-US" dirty="0"/>
-              <a:t>Branches should be used frequently as they are quick and inexpensive. </a:t>
+              <a:t>The staging area can be used to manage and review changes before creating the commit snapshot. </a:t>
             </a:r>
           </a:p>
           <a:p>
             <a:pPr lvl="0"/>
             <a:r>
               <a:rPr lang="en-US" dirty="0"/>
-              <a:t>Branches enable multiple developers to work in parallel on separate lines of development. </a:t>
-            </a:r>
-          </a:p>
-          <a:p>
-            <a:pPr lvl="0"/>
-            <a:r>
-              <a:rPr lang="en-US" dirty="0"/>
-              <a:t>These lines of development are generally different product features. When development is complete on a branch it is then merged into the main line of development.</a:t>
+              <a:t>Utilizing the staging area in this manner provides a buffer area to help refine the contents of the commit.</a:t>
             </a:r>
           </a:p>
           <a:p>
@@ -5470,7 +5525,7 @@
     </p:spTree>
     <p:extLst>
       <p:ext uri="{BB962C8B-B14F-4D97-AF65-F5344CB8AC3E}">
-        <p14:creationId xmlns:p14="http://schemas.microsoft.com/office/powerpoint/2010/main" val="4092013684"/>
+        <p14:creationId xmlns:p14="http://schemas.microsoft.com/office/powerpoint/2010/main" val="2105511052"/>
       </p:ext>
     </p:extLst>
   </p:cSld>
@@ -5502,6 +5557,128 @@
           <p:cNvPr id="2" name="Title 1">
             <a:extLst>
               <a:ext uri="{FF2B5EF4-FFF2-40B4-BE49-F238E27FC236}">
+                <a16:creationId xmlns:a16="http://schemas.microsoft.com/office/drawing/2014/main" id="{9E3A0FA5-E20D-CF4F-B7FD-8254BB326919}"/>
+              </a:ext>
+            </a:extLst>
+          </p:cNvPr>
+          <p:cNvSpPr>
+            <a:spLocks noGrp="1"/>
+          </p:cNvSpPr>
+          <p:nvPr>
+            <p:ph type="title"/>
+          </p:nvPr>
+        </p:nvSpPr>
+        <p:spPr/>
+        <p:txBody>
+          <a:bodyPr/>
+          <a:lstStyle/>
+          <a:p>
+            <a:r>
+              <a:rPr lang="en-US" b="1" dirty="0"/>
+              <a:t>Use Branches</a:t>
+            </a:r>
+            <a:br>
+              <a:rPr lang="en-US" dirty="0"/>
+            </a:br>
+            <a:endParaRPr lang="en-US" dirty="0"/>
+          </a:p>
+        </p:txBody>
+      </p:sp>
+      <p:sp>
+        <p:nvSpPr>
+          <p:cNvPr id="3" name="Content Placeholder 2">
+            <a:extLst>
+              <a:ext uri="{FF2B5EF4-FFF2-40B4-BE49-F238E27FC236}">
+                <a16:creationId xmlns:a16="http://schemas.microsoft.com/office/drawing/2014/main" id="{6B6880DE-11F8-6549-86E6-D8B3FD5DE7A9}"/>
+              </a:ext>
+            </a:extLst>
+          </p:cNvPr>
+          <p:cNvSpPr>
+            <a:spLocks noGrp="1"/>
+          </p:cNvSpPr>
+          <p:nvPr>
+            <p:ph idx="1"/>
+          </p:nvPr>
+        </p:nvSpPr>
+        <p:spPr>
+          <a:xfrm>
+            <a:off x="2773599" y="2052116"/>
+            <a:ext cx="7796540" cy="4131514"/>
+          </a:xfrm>
+        </p:spPr>
+        <p:txBody>
+          <a:bodyPr>
+            <a:normAutofit/>
+          </a:bodyPr>
+          <a:lstStyle/>
+          <a:p>
+            <a:pPr lvl="0"/>
+            <a:r>
+              <a:rPr lang="en-US" dirty="0"/>
+              <a:t>Branching is a powerful mechanism that allows developers to create a separate line of development. </a:t>
+            </a:r>
+          </a:p>
+          <a:p>
+            <a:pPr lvl="0"/>
+            <a:r>
+              <a:rPr lang="en-US" dirty="0"/>
+              <a:t>Branches should be used frequently as they are quick and inexpensive. </a:t>
+            </a:r>
+          </a:p>
+          <a:p>
+            <a:pPr lvl="0"/>
+            <a:r>
+              <a:rPr lang="en-US" dirty="0"/>
+              <a:t>Branches enable multiple developers to work in parallel on separate lines of development. </a:t>
+            </a:r>
+          </a:p>
+          <a:p>
+            <a:pPr lvl="0"/>
+            <a:r>
+              <a:rPr lang="en-US" dirty="0"/>
+              <a:t>These lines of development are generally different product features. When development is complete on a branch it is then merged into the main line of development.</a:t>
+            </a:r>
+          </a:p>
+          <a:p>
+            <a:endParaRPr lang="en-US" dirty="0"/>
+          </a:p>
+        </p:txBody>
+      </p:sp>
+    </p:spTree>
+    <p:extLst>
+      <p:ext uri="{BB962C8B-B14F-4D97-AF65-F5344CB8AC3E}">
+        <p14:creationId xmlns:p14="http://schemas.microsoft.com/office/powerpoint/2010/main" val="4092013684"/>
+      </p:ext>
+    </p:extLst>
+  </p:cSld>
+  <p:clrMapOvr>
+    <a:masterClrMapping/>
+  </p:clrMapOvr>
+</p:sld>
+</file>
+
+<file path=ppt/slides/slide15.xml><?xml version="1.0" encoding="utf-8"?>
+<p:sld xmlns:a="http://schemas.openxmlformats.org/drawingml/2006/main" xmlns:r="http://schemas.openxmlformats.org/officeDocument/2006/relationships" xmlns:p="http://schemas.openxmlformats.org/presentationml/2006/main">
+  <p:cSld>
+    <p:spTree>
+      <p:nvGrpSpPr>
+        <p:cNvPr id="1" name=""/>
+        <p:cNvGrpSpPr/>
+        <p:nvPr/>
+      </p:nvGrpSpPr>
+      <p:grpSpPr>
+        <a:xfrm>
+          <a:off x="0" y="0"/>
+          <a:ext cx="0" cy="0"/>
+          <a:chOff x="0" y="0"/>
+          <a:chExt cx="0" cy="0"/>
+        </a:xfrm>
+      </p:grpSpPr>
+      <p:sp>
+        <p:nvSpPr>
+          <p:cNvPr id="2" name="Title 1">
+            <a:extLst>
+              <a:ext uri="{FF2B5EF4-FFF2-40B4-BE49-F238E27FC236}">
                 <a16:creationId xmlns:a16="http://schemas.microsoft.com/office/drawing/2014/main" id="{8B792422-5CF9-8646-8414-318EECA2ADA6}"/>
               </a:ext>
             </a:extLst>
@@ -5595,7 +5772,7 @@
 </p:sld>
 </file>
 
-<file path=ppt/slides/slide15.xml><?xml version="1.0" encoding="utf-8"?>
+<file path=ppt/slides/slide16.xml><?xml version="1.0" encoding="utf-8"?>
 <p:sld xmlns:a="http://schemas.openxmlformats.org/drawingml/2006/main" xmlns:r="http://schemas.openxmlformats.org/officeDocument/2006/relationships" xmlns:p="http://schemas.openxmlformats.org/presentationml/2006/main">
   <p:cSld>
     <p:spTree>
@@ -5702,7 +5879,7 @@
 </p:sld>
 </file>
 
-<file path=ppt/slides/slide16.xml><?xml version="1.0" encoding="utf-8"?>
+<file path=ppt/slides/slide17.xml><?xml version="1.0" encoding="utf-8"?>
 <p:sld xmlns:a="http://schemas.openxmlformats.org/drawingml/2006/main" xmlns:r="http://schemas.openxmlformats.org/officeDocument/2006/relationships" xmlns:p="http://schemas.openxmlformats.org/presentationml/2006/main">
   <p:cSld>
     <p:spTree>
@@ -5826,184 +6003,6 @@
 </p:sld>
 </file>
 
-<file path=ppt/slides/slide17.xml><?xml version="1.0" encoding="utf-8"?>
-<p:sld xmlns:a="http://schemas.openxmlformats.org/drawingml/2006/main" xmlns:r="http://schemas.openxmlformats.org/officeDocument/2006/relationships" xmlns:p="http://schemas.openxmlformats.org/presentationml/2006/main">
-  <p:cSld>
-    <p:spTree>
-      <p:nvGrpSpPr>
-        <p:cNvPr id="1" name=""/>
-        <p:cNvGrpSpPr/>
-        <p:nvPr/>
-      </p:nvGrpSpPr>
-      <p:grpSpPr>
-        <a:xfrm>
-          <a:off x="0" y="0"/>
-          <a:ext cx="0" cy="0"/>
-          <a:chOff x="0" y="0"/>
-          <a:chExt cx="0" cy="0"/>
-        </a:xfrm>
-      </p:grpSpPr>
-      <p:sp>
-        <p:nvSpPr>
-          <p:cNvPr id="2" name="Title 1">
-            <a:extLst>
-              <a:ext uri="{FF2B5EF4-FFF2-40B4-BE49-F238E27FC236}">
-                <a16:creationId xmlns:a16="http://schemas.microsoft.com/office/drawing/2014/main" id="{35F7B4E0-2A72-F745-87B9-B33B6F67B9AA}"/>
-              </a:ext>
-            </a:extLst>
-          </p:cNvPr>
-          <p:cNvSpPr>
-            <a:spLocks noGrp="1"/>
-          </p:cNvSpPr>
-          <p:nvPr>
-            <p:ph type="title"/>
-          </p:nvPr>
-        </p:nvSpPr>
-        <p:spPr/>
-        <p:txBody>
-          <a:bodyPr/>
-          <a:lstStyle/>
-          <a:p>
-            <a:r>
-              <a:rPr lang="en-US" dirty="0"/>
-              <a:t>What version?</a:t>
-            </a:r>
-            <a:br>
-              <a:rPr lang="en-US" dirty="0"/>
-            </a:br>
-            <a:r>
-              <a:rPr lang="en-US" dirty="0"/>
-              <a:t>Who are you?</a:t>
-            </a:r>
-          </a:p>
-        </p:txBody>
-      </p:sp>
-      <p:sp>
-        <p:nvSpPr>
-          <p:cNvPr id="3" name="Content Placeholder 2">
-            <a:extLst>
-              <a:ext uri="{FF2B5EF4-FFF2-40B4-BE49-F238E27FC236}">
-                <a16:creationId xmlns:a16="http://schemas.microsoft.com/office/drawing/2014/main" id="{D1909720-E6A8-C14D-B8CA-12731FDEA956}"/>
-              </a:ext>
-            </a:extLst>
-          </p:cNvPr>
-          <p:cNvSpPr>
-            <a:spLocks noGrp="1"/>
-          </p:cNvSpPr>
-          <p:nvPr>
-            <p:ph idx="1"/>
-          </p:nvPr>
-        </p:nvSpPr>
-        <p:spPr/>
-        <p:txBody>
-          <a:bodyPr>
-            <a:normAutofit fontScale="92500" lnSpcReduction="10000"/>
-          </a:bodyPr>
-          <a:lstStyle/>
-          <a:p>
-            <a:r>
-              <a:rPr lang="en-US" dirty="0"/>
-              <a:t>git –version</a:t>
-            </a:r>
-          </a:p>
-          <a:p>
-            <a:r>
-              <a:rPr lang="en-US" dirty="0"/>
-              <a:t>git config --global </a:t>
-            </a:r>
-            <a:r>
-              <a:rPr lang="en-US" dirty="0" err="1"/>
-              <a:t>user.name</a:t>
-            </a:r>
-            <a:r>
-              <a:rPr lang="en-US" dirty="0"/>
-              <a:t> ”Gary James”</a:t>
-            </a:r>
-          </a:p>
-          <a:p>
-            <a:r>
-              <a:rPr lang="en-US" dirty="0"/>
-              <a:t>git config --global </a:t>
-            </a:r>
-            <a:r>
-              <a:rPr lang="en-US" dirty="0" err="1"/>
-              <a:t>user.email</a:t>
-            </a:r>
-            <a:r>
-              <a:rPr lang="en-US" dirty="0"/>
-              <a:t> </a:t>
-            </a:r>
-            <a:r>
-              <a:rPr lang="en-US" dirty="0">
-                <a:hlinkClick r:id="rId2"/>
-              </a:rPr>
-              <a:t>gtjames@gmail.com</a:t>
-            </a:r>
-            <a:endParaRPr lang="en-US" dirty="0"/>
-          </a:p>
-          <a:p>
-            <a:endParaRPr lang="en-US" dirty="0"/>
-          </a:p>
-          <a:p>
-            <a:r>
-              <a:rPr lang="en-US" dirty="0"/>
-              <a:t>/.git/config – Repository-specific settings.</a:t>
-            </a:r>
-          </a:p>
-          <a:p>
-            <a:r>
-              <a:rPr lang="en-US" dirty="0"/>
-              <a:t>~/.</a:t>
-            </a:r>
-            <a:r>
-              <a:rPr lang="en-US" dirty="0" err="1"/>
-              <a:t>gitconfig</a:t>
-            </a:r>
-            <a:r>
-              <a:rPr lang="en-US" dirty="0"/>
-              <a:t> – User-specific settings. This is where options set with the --global flag are stored.</a:t>
-            </a:r>
-          </a:p>
-          <a:p>
-            <a:r>
-              <a:rPr lang="en-US" dirty="0"/>
-              <a:t>$(prefix)/</a:t>
-            </a:r>
-            <a:r>
-              <a:rPr lang="en-US" dirty="0" err="1"/>
-              <a:t>etc</a:t>
-            </a:r>
-            <a:r>
-              <a:rPr lang="en-US" dirty="0"/>
-              <a:t>/</a:t>
-            </a:r>
-            <a:r>
-              <a:rPr lang="en-US" dirty="0" err="1"/>
-              <a:t>gitconfig</a:t>
-            </a:r>
-            <a:r>
-              <a:rPr lang="en-US" dirty="0"/>
-              <a:t> – System-wide settings.</a:t>
-            </a:r>
-          </a:p>
-          <a:p>
-            <a:endParaRPr lang="en-US" dirty="0"/>
-          </a:p>
-        </p:txBody>
-      </p:sp>
-    </p:spTree>
-    <p:extLst>
-      <p:ext uri="{BB962C8B-B14F-4D97-AF65-F5344CB8AC3E}">
-        <p14:creationId xmlns:p14="http://schemas.microsoft.com/office/powerpoint/2010/main" val="3785429819"/>
-      </p:ext>
-    </p:extLst>
-  </p:cSld>
-  <p:clrMapOvr>
-    <a:masterClrMapping/>
-  </p:clrMapOvr>
-</p:sld>
-</file>
-
 <file path=ppt/slides/slide18.xml><?xml version="1.0" encoding="utf-8"?>
 <p:sld xmlns:a="http://schemas.openxmlformats.org/drawingml/2006/main" xmlns:r="http://schemas.openxmlformats.org/officeDocument/2006/relationships" xmlns:p="http://schemas.openxmlformats.org/presentationml/2006/main">
   <p:cSld>
@@ -6026,6 +6025,184 @@
           <p:cNvPr id="2" name="Title 1">
             <a:extLst>
               <a:ext uri="{FF2B5EF4-FFF2-40B4-BE49-F238E27FC236}">
+                <a16:creationId xmlns:a16="http://schemas.microsoft.com/office/drawing/2014/main" id="{35F7B4E0-2A72-F745-87B9-B33B6F67B9AA}"/>
+              </a:ext>
+            </a:extLst>
+          </p:cNvPr>
+          <p:cNvSpPr>
+            <a:spLocks noGrp="1"/>
+          </p:cNvSpPr>
+          <p:nvPr>
+            <p:ph type="title"/>
+          </p:nvPr>
+        </p:nvSpPr>
+        <p:spPr/>
+        <p:txBody>
+          <a:bodyPr/>
+          <a:lstStyle/>
+          <a:p>
+            <a:r>
+              <a:rPr lang="en-US" dirty="0"/>
+              <a:t>What version?</a:t>
+            </a:r>
+            <a:br>
+              <a:rPr lang="en-US" dirty="0"/>
+            </a:br>
+            <a:r>
+              <a:rPr lang="en-US" dirty="0"/>
+              <a:t>Who are you?</a:t>
+            </a:r>
+          </a:p>
+        </p:txBody>
+      </p:sp>
+      <p:sp>
+        <p:nvSpPr>
+          <p:cNvPr id="3" name="Content Placeholder 2">
+            <a:extLst>
+              <a:ext uri="{FF2B5EF4-FFF2-40B4-BE49-F238E27FC236}">
+                <a16:creationId xmlns:a16="http://schemas.microsoft.com/office/drawing/2014/main" id="{D1909720-E6A8-C14D-B8CA-12731FDEA956}"/>
+              </a:ext>
+            </a:extLst>
+          </p:cNvPr>
+          <p:cNvSpPr>
+            <a:spLocks noGrp="1"/>
+          </p:cNvSpPr>
+          <p:nvPr>
+            <p:ph idx="1"/>
+          </p:nvPr>
+        </p:nvSpPr>
+        <p:spPr/>
+        <p:txBody>
+          <a:bodyPr>
+            <a:normAutofit fontScale="92500" lnSpcReduction="10000"/>
+          </a:bodyPr>
+          <a:lstStyle/>
+          <a:p>
+            <a:r>
+              <a:rPr lang="en-US" dirty="0"/>
+              <a:t>git –version</a:t>
+            </a:r>
+          </a:p>
+          <a:p>
+            <a:r>
+              <a:rPr lang="en-US" dirty="0"/>
+              <a:t>git config --global </a:t>
+            </a:r>
+            <a:r>
+              <a:rPr lang="en-US" dirty="0" err="1"/>
+              <a:t>user.name</a:t>
+            </a:r>
+            <a:r>
+              <a:rPr lang="en-US" dirty="0"/>
+              <a:t> ”Gary James”</a:t>
+            </a:r>
+          </a:p>
+          <a:p>
+            <a:r>
+              <a:rPr lang="en-US" dirty="0"/>
+              <a:t>git config --global </a:t>
+            </a:r>
+            <a:r>
+              <a:rPr lang="en-US" dirty="0" err="1"/>
+              <a:t>user.email</a:t>
+            </a:r>
+            <a:r>
+              <a:rPr lang="en-US" dirty="0"/>
+              <a:t> </a:t>
+            </a:r>
+            <a:r>
+              <a:rPr lang="en-US" dirty="0">
+                <a:hlinkClick r:id="rId2"/>
+              </a:rPr>
+              <a:t>gtjames@gmail.com</a:t>
+            </a:r>
+            <a:endParaRPr lang="en-US" dirty="0"/>
+          </a:p>
+          <a:p>
+            <a:endParaRPr lang="en-US" dirty="0"/>
+          </a:p>
+          <a:p>
+            <a:r>
+              <a:rPr lang="en-US" dirty="0"/>
+              <a:t>/.git/config – Repository-specific settings.</a:t>
+            </a:r>
+          </a:p>
+          <a:p>
+            <a:r>
+              <a:rPr lang="en-US" dirty="0"/>
+              <a:t>~/.</a:t>
+            </a:r>
+            <a:r>
+              <a:rPr lang="en-US" dirty="0" err="1"/>
+              <a:t>gitconfig</a:t>
+            </a:r>
+            <a:r>
+              <a:rPr lang="en-US" dirty="0"/>
+              <a:t> – User-specific settings. This is where options set with the --global flag are stored.</a:t>
+            </a:r>
+          </a:p>
+          <a:p>
+            <a:r>
+              <a:rPr lang="en-US" dirty="0"/>
+              <a:t>$(prefix)/</a:t>
+            </a:r>
+            <a:r>
+              <a:rPr lang="en-US" dirty="0" err="1"/>
+              <a:t>etc</a:t>
+            </a:r>
+            <a:r>
+              <a:rPr lang="en-US" dirty="0"/>
+              <a:t>/</a:t>
+            </a:r>
+            <a:r>
+              <a:rPr lang="en-US" dirty="0" err="1"/>
+              <a:t>gitconfig</a:t>
+            </a:r>
+            <a:r>
+              <a:rPr lang="en-US" dirty="0"/>
+              <a:t> – System-wide settings.</a:t>
+            </a:r>
+          </a:p>
+          <a:p>
+            <a:endParaRPr lang="en-US" dirty="0"/>
+          </a:p>
+        </p:txBody>
+      </p:sp>
+    </p:spTree>
+    <p:extLst>
+      <p:ext uri="{BB962C8B-B14F-4D97-AF65-F5344CB8AC3E}">
+        <p14:creationId xmlns:p14="http://schemas.microsoft.com/office/powerpoint/2010/main" val="3785429819"/>
+      </p:ext>
+    </p:extLst>
+  </p:cSld>
+  <p:clrMapOvr>
+    <a:masterClrMapping/>
+  </p:clrMapOvr>
+</p:sld>
+</file>
+
+<file path=ppt/slides/slide19.xml><?xml version="1.0" encoding="utf-8"?>
+<p:sld xmlns:a="http://schemas.openxmlformats.org/drawingml/2006/main" xmlns:r="http://schemas.openxmlformats.org/officeDocument/2006/relationships" xmlns:p="http://schemas.openxmlformats.org/presentationml/2006/main">
+  <p:cSld>
+    <p:spTree>
+      <p:nvGrpSpPr>
+        <p:cNvPr id="1" name=""/>
+        <p:cNvGrpSpPr/>
+        <p:nvPr/>
+      </p:nvGrpSpPr>
+      <p:grpSpPr>
+        <a:xfrm>
+          <a:off x="0" y="0"/>
+          <a:ext cx="0" cy="0"/>
+          <a:chOff x="0" y="0"/>
+          <a:chExt cx="0" cy="0"/>
+        </a:xfrm>
+      </p:grpSpPr>
+      <p:sp>
+        <p:nvSpPr>
+          <p:cNvPr id="2" name="Title 1">
+            <a:extLst>
+              <a:ext uri="{FF2B5EF4-FFF2-40B4-BE49-F238E27FC236}">
                 <a16:creationId xmlns:a16="http://schemas.microsoft.com/office/drawing/2014/main" id="{676844CB-C481-014D-94DD-E32DA3745CA4}"/>
               </a:ext>
             </a:extLst>
@@ -6073,7 +6250,7 @@
         </p:spPr>
         <p:txBody>
           <a:bodyPr>
-            <a:normAutofit/>
+            <a:normAutofit fontScale="92500" lnSpcReduction="10000"/>
           </a:bodyPr>
           <a:lstStyle/>
           <a:p>
@@ -6110,7 +6287,14 @@
           <a:p>
             <a:r>
               <a:rPr lang="en-US" dirty="0"/>
-              <a:t>git add . Or names of files	files are now staged</a:t>
+              <a:t>git add . Or names of files</a:t>
+            </a:r>
+          </a:p>
+          <a:p>
+            <a:pPr lvl="1"/>
+            <a:r>
+              <a:rPr lang="en-US" dirty="0"/>
+              <a:t>files are now staged</a:t>
             </a:r>
           </a:p>
           <a:p>
@@ -6141,7 +6325,170 @@
 </p:sld>
 </file>
 
-<file path=ppt/slides/slide19.xml><?xml version="1.0" encoding="utf-8"?>
+<file path=ppt/slides/slide2.xml><?xml version="1.0" encoding="utf-8"?>
+<p:sld xmlns:a="http://schemas.openxmlformats.org/drawingml/2006/main" xmlns:r="http://schemas.openxmlformats.org/officeDocument/2006/relationships" xmlns:p="http://schemas.openxmlformats.org/presentationml/2006/main">
+  <p:cSld>
+    <p:spTree>
+      <p:nvGrpSpPr>
+        <p:cNvPr id="1" name=""/>
+        <p:cNvGrpSpPr/>
+        <p:nvPr/>
+      </p:nvGrpSpPr>
+      <p:grpSpPr>
+        <a:xfrm>
+          <a:off x="0" y="0"/>
+          <a:ext cx="0" cy="0"/>
+          <a:chOff x="0" y="0"/>
+          <a:chExt cx="0" cy="0"/>
+        </a:xfrm>
+      </p:grpSpPr>
+      <p:sp>
+        <p:nvSpPr>
+          <p:cNvPr id="2" name="Title 1">
+            <a:extLst>
+              <a:ext uri="{FF2B5EF4-FFF2-40B4-BE49-F238E27FC236}">
+                <a16:creationId xmlns:a16="http://schemas.microsoft.com/office/drawing/2014/main" id="{15074897-DBD9-814B-9626-5070CF7189D5}"/>
+              </a:ext>
+            </a:extLst>
+          </p:cNvPr>
+          <p:cNvSpPr>
+            <a:spLocks noGrp="1"/>
+          </p:cNvSpPr>
+          <p:nvPr>
+            <p:ph type="title"/>
+          </p:nvPr>
+        </p:nvSpPr>
+        <p:spPr/>
+        <p:txBody>
+          <a:bodyPr/>
+          <a:lstStyle/>
+          <a:p>
+            <a:r>
+              <a:rPr lang="en-US" dirty="0"/>
+              <a:t>git</a:t>
+            </a:r>
+          </a:p>
+        </p:txBody>
+      </p:sp>
+      <p:sp>
+        <p:nvSpPr>
+          <p:cNvPr id="3" name="Content Placeholder 2">
+            <a:extLst>
+              <a:ext uri="{FF2B5EF4-FFF2-40B4-BE49-F238E27FC236}">
+                <a16:creationId xmlns:a16="http://schemas.microsoft.com/office/drawing/2014/main" id="{C86AE85E-1F59-AE42-9365-1715F0CD1D92}"/>
+              </a:ext>
+            </a:extLst>
+          </p:cNvPr>
+          <p:cNvSpPr>
+            <a:spLocks noGrp="1"/>
+          </p:cNvSpPr>
+          <p:nvPr>
+            <p:ph idx="1"/>
+          </p:nvPr>
+        </p:nvSpPr>
+        <p:spPr>
+          <a:xfrm>
+            <a:off x="2773599" y="1671144"/>
+            <a:ext cx="7796540" cy="4378799"/>
+          </a:xfrm>
+        </p:spPr>
+        <p:txBody>
+          <a:bodyPr>
+            <a:normAutofit fontScale="77500" lnSpcReduction="20000"/>
+          </a:bodyPr>
+          <a:lstStyle/>
+          <a:p>
+            <a:r>
+              <a:rPr lang="en-US" dirty="0"/>
+              <a:t>Created by Linus Torvalds in 2005</a:t>
+            </a:r>
+          </a:p>
+          <a:p>
+            <a:pPr lvl="1"/>
+            <a:r>
+              <a:rPr lang="en-US" dirty="0"/>
+              <a:t>Creator of Linux OS Kernel</a:t>
+            </a:r>
+          </a:p>
+          <a:p>
+            <a:r>
+              <a:rPr lang="en-US" dirty="0"/>
+              <a:t>Fast</a:t>
+            </a:r>
+          </a:p>
+          <a:p>
+            <a:r>
+              <a:rPr lang="en-US" dirty="0"/>
+              <a:t>Distributed</a:t>
+            </a:r>
+          </a:p>
+          <a:p>
+            <a:r>
+              <a:rPr lang="en-US" dirty="0"/>
+              <a:t>Data Integrity</a:t>
+            </a:r>
+          </a:p>
+          <a:p>
+            <a:r>
+              <a:rPr lang="en-US" dirty="0"/>
+              <a:t>Staging Area</a:t>
+            </a:r>
+          </a:p>
+          <a:p>
+            <a:r>
+              <a:rPr lang="en-US" dirty="0"/>
+              <a:t>Open Source</a:t>
+            </a:r>
+          </a:p>
+          <a:p>
+            <a:r>
+              <a:rPr lang="en-US" dirty="0"/>
+              <a:t>The Standard</a:t>
+            </a:r>
+          </a:p>
+          <a:p>
+            <a:r>
+              <a:rPr lang="en-US" dirty="0"/>
+              <a:t>Any decent IDE is integrated with git and </a:t>
+            </a:r>
+            <a:r>
+              <a:rPr lang="en-US" dirty="0" err="1"/>
+              <a:t>gitHub</a:t>
+            </a:r>
+            <a:endParaRPr lang="en-US" dirty="0"/>
+          </a:p>
+          <a:p>
+            <a:r>
+              <a:rPr lang="en-US" dirty="0" err="1"/>
+              <a:t>github</a:t>
+            </a:r>
+            <a:r>
+              <a:rPr lang="en-US" dirty="0"/>
+              <a:t> has 190M repos as of Jan 2020</a:t>
+            </a:r>
+          </a:p>
+          <a:p>
+            <a:endParaRPr lang="en-US" dirty="0"/>
+          </a:p>
+          <a:p>
+            <a:endParaRPr lang="en-US" dirty="0"/>
+          </a:p>
+        </p:txBody>
+      </p:sp>
+    </p:spTree>
+    <p:extLst>
+      <p:ext uri="{BB962C8B-B14F-4D97-AF65-F5344CB8AC3E}">
+        <p14:creationId xmlns:p14="http://schemas.microsoft.com/office/powerpoint/2010/main" val="1300170297"/>
+      </p:ext>
+    </p:extLst>
+  </p:cSld>
+  <p:clrMapOvr>
+    <a:masterClrMapping/>
+  </p:clrMapOvr>
+</p:sld>
+</file>
+
+<file path=ppt/slides/slide20.xml><?xml version="1.0" encoding="utf-8"?>
 <p:sld xmlns:a="http://schemas.openxmlformats.org/drawingml/2006/main" xmlns:r="http://schemas.openxmlformats.org/officeDocument/2006/relationships" xmlns:p="http://schemas.openxmlformats.org/presentationml/2006/main">
   <p:cSld>
     <p:spTree>
@@ -6180,7 +6527,7 @@
         </p:blipFill>
         <p:spPr>
           <a:xfrm>
-            <a:off x="6400800" y="1479550"/>
+            <a:off x="7212970" y="1457779"/>
             <a:ext cx="4953000" cy="3686810"/>
           </a:xfrm>
           <a:prstGeom prst="rect">
@@ -6313,387 +6660,6 @@
     <p:extLst>
       <p:ext uri="{BB962C8B-B14F-4D97-AF65-F5344CB8AC3E}">
         <p14:creationId xmlns:p14="http://schemas.microsoft.com/office/powerpoint/2010/main" val="3158992277"/>
-      </p:ext>
-    </p:extLst>
-  </p:cSld>
-  <p:clrMapOvr>
-    <a:masterClrMapping/>
-  </p:clrMapOvr>
-</p:sld>
-</file>
-
-<file path=ppt/slides/slide2.xml><?xml version="1.0" encoding="utf-8"?>
-<p:sld xmlns:a="http://schemas.openxmlformats.org/drawingml/2006/main" xmlns:r="http://schemas.openxmlformats.org/officeDocument/2006/relationships" xmlns:p="http://schemas.openxmlformats.org/presentationml/2006/main">
-  <p:cSld>
-    <p:spTree>
-      <p:nvGrpSpPr>
-        <p:cNvPr id="1" name=""/>
-        <p:cNvGrpSpPr/>
-        <p:nvPr/>
-      </p:nvGrpSpPr>
-      <p:grpSpPr>
-        <a:xfrm>
-          <a:off x="0" y="0"/>
-          <a:ext cx="0" cy="0"/>
-          <a:chOff x="0" y="0"/>
-          <a:chExt cx="0" cy="0"/>
-        </a:xfrm>
-      </p:grpSpPr>
-      <p:sp>
-        <p:nvSpPr>
-          <p:cNvPr id="2" name="Title 1">
-            <a:extLst>
-              <a:ext uri="{FF2B5EF4-FFF2-40B4-BE49-F238E27FC236}">
-                <a16:creationId xmlns:a16="http://schemas.microsoft.com/office/drawing/2014/main" id="{15074897-DBD9-814B-9626-5070CF7189D5}"/>
-              </a:ext>
-            </a:extLst>
-          </p:cNvPr>
-          <p:cNvSpPr>
-            <a:spLocks noGrp="1"/>
-          </p:cNvSpPr>
-          <p:nvPr>
-            <p:ph type="title"/>
-          </p:nvPr>
-        </p:nvSpPr>
-        <p:spPr/>
-        <p:txBody>
-          <a:bodyPr/>
-          <a:lstStyle/>
-          <a:p>
-            <a:r>
-              <a:rPr lang="en-US" dirty="0"/>
-              <a:t>git</a:t>
-            </a:r>
-          </a:p>
-        </p:txBody>
-      </p:sp>
-      <p:sp>
-        <p:nvSpPr>
-          <p:cNvPr id="3" name="Content Placeholder 2">
-            <a:extLst>
-              <a:ext uri="{FF2B5EF4-FFF2-40B4-BE49-F238E27FC236}">
-                <a16:creationId xmlns:a16="http://schemas.microsoft.com/office/drawing/2014/main" id="{C86AE85E-1F59-AE42-9365-1715F0CD1D92}"/>
-              </a:ext>
-            </a:extLst>
-          </p:cNvPr>
-          <p:cNvSpPr>
-            <a:spLocks noGrp="1"/>
-          </p:cNvSpPr>
-          <p:nvPr>
-            <p:ph idx="1"/>
-          </p:nvPr>
-        </p:nvSpPr>
-        <p:spPr>
-          <a:xfrm>
-            <a:off x="2773599" y="1671144"/>
-            <a:ext cx="7796540" cy="4378799"/>
-          </a:xfrm>
-        </p:spPr>
-        <p:txBody>
-          <a:bodyPr>
-            <a:normAutofit fontScale="77500" lnSpcReduction="20000"/>
-          </a:bodyPr>
-          <a:lstStyle/>
-          <a:p>
-            <a:r>
-              <a:rPr lang="en-US" dirty="0"/>
-              <a:t>Created by Linus Torvalds in 2005</a:t>
-            </a:r>
-          </a:p>
-          <a:p>
-            <a:pPr lvl="1"/>
-            <a:r>
-              <a:rPr lang="en-US" dirty="0"/>
-              <a:t>Creator of Linux OS Kernel</a:t>
-            </a:r>
-          </a:p>
-          <a:p>
-            <a:r>
-              <a:rPr lang="en-US" dirty="0"/>
-              <a:t>Fast</a:t>
-            </a:r>
-          </a:p>
-          <a:p>
-            <a:r>
-              <a:rPr lang="en-US" dirty="0"/>
-              <a:t>Distributed</a:t>
-            </a:r>
-          </a:p>
-          <a:p>
-            <a:r>
-              <a:rPr lang="en-US" dirty="0"/>
-              <a:t>Data Integrity</a:t>
-            </a:r>
-          </a:p>
-          <a:p>
-            <a:r>
-              <a:rPr lang="en-US" dirty="0"/>
-              <a:t>Staging Area</a:t>
-            </a:r>
-          </a:p>
-          <a:p>
-            <a:r>
-              <a:rPr lang="en-US" dirty="0"/>
-              <a:t>Open Source</a:t>
-            </a:r>
-          </a:p>
-          <a:p>
-            <a:r>
-              <a:rPr lang="en-US" dirty="0"/>
-              <a:t>The Standard</a:t>
-            </a:r>
-          </a:p>
-          <a:p>
-            <a:r>
-              <a:rPr lang="en-US" dirty="0"/>
-              <a:t>Any decent IDE is integrated with git and </a:t>
-            </a:r>
-            <a:r>
-              <a:rPr lang="en-US" dirty="0" err="1"/>
-              <a:t>gitHub</a:t>
-            </a:r>
-            <a:endParaRPr lang="en-US" dirty="0"/>
-          </a:p>
-          <a:p>
-            <a:r>
-              <a:rPr lang="en-US" dirty="0" err="1"/>
-              <a:t>github</a:t>
-            </a:r>
-            <a:r>
-              <a:rPr lang="en-US" dirty="0"/>
-              <a:t> has 190M repos as of Jan 2020</a:t>
-            </a:r>
-          </a:p>
-          <a:p>
-            <a:endParaRPr lang="en-US" dirty="0"/>
-          </a:p>
-          <a:p>
-            <a:endParaRPr lang="en-US" dirty="0"/>
-          </a:p>
-        </p:txBody>
-      </p:sp>
-    </p:spTree>
-    <p:extLst>
-      <p:ext uri="{BB962C8B-B14F-4D97-AF65-F5344CB8AC3E}">
-        <p14:creationId xmlns:p14="http://schemas.microsoft.com/office/powerpoint/2010/main" val="1300170297"/>
-      </p:ext>
-    </p:extLst>
-  </p:cSld>
-  <p:clrMapOvr>
-    <a:masterClrMapping/>
-  </p:clrMapOvr>
-</p:sld>
-</file>
-
-<file path=ppt/slides/slide20.xml><?xml version="1.0" encoding="utf-8"?>
-<p:sld xmlns:a="http://schemas.openxmlformats.org/drawingml/2006/main" xmlns:r="http://schemas.openxmlformats.org/officeDocument/2006/relationships" xmlns:p="http://schemas.openxmlformats.org/presentationml/2006/main">
-  <p:cSld>
-    <p:spTree>
-      <p:nvGrpSpPr>
-        <p:cNvPr id="1" name=""/>
-        <p:cNvGrpSpPr/>
-        <p:nvPr/>
-      </p:nvGrpSpPr>
-      <p:grpSpPr>
-        <a:xfrm>
-          <a:off x="0" y="0"/>
-          <a:ext cx="0" cy="0"/>
-          <a:chOff x="0" y="0"/>
-          <a:chExt cx="0" cy="0"/>
-        </a:xfrm>
-      </p:grpSpPr>
-      <p:sp>
-        <p:nvSpPr>
-          <p:cNvPr id="2" name="Title 1">
-            <a:extLst>
-              <a:ext uri="{FF2B5EF4-FFF2-40B4-BE49-F238E27FC236}">
-                <a16:creationId xmlns:a16="http://schemas.microsoft.com/office/drawing/2014/main" id="{676844CB-C481-014D-94DD-E32DA3745CA4}"/>
-              </a:ext>
-            </a:extLst>
-          </p:cNvPr>
-          <p:cNvSpPr>
-            <a:spLocks noGrp="1"/>
-          </p:cNvSpPr>
-          <p:nvPr>
-            <p:ph type="title"/>
-          </p:nvPr>
-        </p:nvSpPr>
-        <p:spPr/>
-        <p:txBody>
-          <a:bodyPr/>
-          <a:lstStyle/>
-          <a:p>
-            <a:r>
-              <a:rPr lang="en-US" dirty="0"/>
-              <a:t>What is happening in the repo</a:t>
-            </a:r>
-          </a:p>
-        </p:txBody>
-      </p:sp>
-      <p:sp>
-        <p:nvSpPr>
-          <p:cNvPr id="3" name="Content Placeholder 2">
-            <a:extLst>
-              <a:ext uri="{FF2B5EF4-FFF2-40B4-BE49-F238E27FC236}">
-                <a16:creationId xmlns:a16="http://schemas.microsoft.com/office/drawing/2014/main" id="{EAAAC92D-6C1D-634B-B64D-87B2AB8FB901}"/>
-              </a:ext>
-            </a:extLst>
-          </p:cNvPr>
-          <p:cNvSpPr>
-            <a:spLocks noGrp="1"/>
-          </p:cNvSpPr>
-          <p:nvPr>
-            <p:ph idx="1"/>
-          </p:nvPr>
-        </p:nvSpPr>
-        <p:spPr>
-          <a:xfrm>
-            <a:off x="2773599" y="2052116"/>
-            <a:ext cx="7796540" cy="1456894"/>
-          </a:xfrm>
-        </p:spPr>
-        <p:txBody>
-          <a:bodyPr>
-            <a:normAutofit/>
-          </a:bodyPr>
-          <a:lstStyle/>
-          <a:p>
-            <a:r>
-              <a:rPr lang="en-US" dirty="0"/>
-              <a:t>Echo “create a dummy file” &gt; </a:t>
-            </a:r>
-            <a:r>
-              <a:rPr lang="en-US" dirty="0" err="1"/>
-              <a:t>file.txt</a:t>
-            </a:r>
-            <a:endParaRPr lang="en-US" dirty="0"/>
-          </a:p>
-          <a:p>
-            <a:r>
-              <a:rPr lang="en-US" dirty="0"/>
-              <a:t>git status</a:t>
-            </a:r>
-          </a:p>
-        </p:txBody>
-      </p:sp>
-      <p:sp>
-        <p:nvSpPr>
-          <p:cNvPr id="4" name="TextBox 3">
-            <a:extLst>
-              <a:ext uri="{FF2B5EF4-FFF2-40B4-BE49-F238E27FC236}">
-                <a16:creationId xmlns:a16="http://schemas.microsoft.com/office/drawing/2014/main" id="{2829EE56-DF2C-3542-AA1C-27A696AAEA95}"/>
-              </a:ext>
-            </a:extLst>
-          </p:cNvPr>
-          <p:cNvSpPr txBox="1"/>
-          <p:nvPr/>
-        </p:nvSpPr>
-        <p:spPr>
-          <a:xfrm>
-            <a:off x="2087176" y="3957053"/>
-            <a:ext cx="9007594" cy="2031325"/>
-          </a:xfrm>
-          <a:prstGeom prst="rect">
-            <a:avLst/>
-          </a:prstGeom>
-          <a:solidFill>
-            <a:schemeClr val="tx1">
-              <a:lumMod val="95000"/>
-            </a:schemeClr>
-          </a:solidFill>
-        </p:spPr>
-        <p:txBody>
-          <a:bodyPr wrap="none" rtlCol="0">
-            <a:spAutoFit/>
-          </a:bodyPr>
-          <a:lstStyle/>
-          <a:p>
-            <a:r>
-              <a:rPr lang="en-US" dirty="0">
-                <a:solidFill>
-                  <a:schemeClr val="bg1"/>
-                </a:solidFill>
-              </a:rPr>
-              <a:t>On branch main</a:t>
-            </a:r>
-          </a:p>
-          <a:p>
-            <a:endParaRPr lang="en-US" dirty="0">
-              <a:solidFill>
-                <a:schemeClr val="bg1"/>
-              </a:solidFill>
-            </a:endParaRPr>
-          </a:p>
-          <a:p>
-            <a:r>
-              <a:rPr lang="en-US" dirty="0">
-                <a:solidFill>
-                  <a:schemeClr val="bg1"/>
-                </a:solidFill>
-                <a:latin typeface="Courier" pitchFamily="2" charset="0"/>
-              </a:rPr>
-              <a:t>No commits yet</a:t>
-            </a:r>
-            <a:br>
-              <a:rPr lang="en-US" dirty="0">
-                <a:solidFill>
-                  <a:schemeClr val="bg1"/>
-                </a:solidFill>
-                <a:latin typeface="Courier" pitchFamily="2" charset="0"/>
-              </a:rPr>
-            </a:br>
-            <a:endParaRPr lang="en-US" dirty="0">
-              <a:solidFill>
-                <a:schemeClr val="bg1"/>
-              </a:solidFill>
-              <a:latin typeface="Courier" pitchFamily="2" charset="0"/>
-            </a:endParaRPr>
-          </a:p>
-          <a:p>
-            <a:r>
-              <a:rPr lang="en-US" dirty="0">
-                <a:solidFill>
-                  <a:schemeClr val="bg1"/>
-                </a:solidFill>
-                <a:latin typeface="Courier" pitchFamily="2" charset="0"/>
-              </a:rPr>
-              <a:t>Untracked files:</a:t>
-            </a:r>
-          </a:p>
-          <a:p>
-            <a:r>
-              <a:rPr lang="en-US" dirty="0">
-                <a:solidFill>
-                  <a:schemeClr val="bg1"/>
-                </a:solidFill>
-                <a:latin typeface="Courier" pitchFamily="2" charset="0"/>
-              </a:rPr>
-              <a:t>  (use "git add &lt;file&gt;..." to include in what will be committed)</a:t>
-            </a:r>
-          </a:p>
-          <a:p>
-            <a:r>
-              <a:rPr lang="en-US" dirty="0" err="1">
-                <a:solidFill>
-                  <a:srgbClr val="FF0000"/>
-                </a:solidFill>
-                <a:latin typeface="Courier" pitchFamily="2" charset="0"/>
-              </a:rPr>
-              <a:t>file.txt</a:t>
-            </a:r>
-            <a:endParaRPr lang="en-US" dirty="0">
-              <a:solidFill>
-                <a:srgbClr val="FF0000"/>
-              </a:solidFill>
-              <a:latin typeface="Courier" pitchFamily="2" charset="0"/>
-            </a:endParaRPr>
-          </a:p>
-        </p:txBody>
-      </p:sp>
-    </p:spTree>
-    <p:extLst>
-      <p:ext uri="{BB962C8B-B14F-4D97-AF65-F5344CB8AC3E}">
-        <p14:creationId xmlns:p14="http://schemas.microsoft.com/office/powerpoint/2010/main" val="337593047"/>
       </p:ext>
     </p:extLst>
   </p:cSld>
@@ -6766,19 +6732,19 @@
         </p:nvSpPr>
         <p:spPr>
           <a:xfrm>
-            <a:off x="2773599" y="2303576"/>
+            <a:off x="2773599" y="2052116"/>
             <a:ext cx="7796540" cy="1456894"/>
           </a:xfrm>
         </p:spPr>
         <p:txBody>
           <a:bodyPr>
-            <a:normAutofit fontScale="92500" lnSpcReduction="10000"/>
+            <a:normAutofit/>
           </a:bodyPr>
           <a:lstStyle/>
           <a:p>
             <a:r>
               <a:rPr lang="en-US" dirty="0"/>
-              <a:t>git add </a:t>
+              <a:t>Echo “create a dummy file” &gt; </a:t>
             </a:r>
             <a:r>
               <a:rPr lang="en-US" dirty="0" err="1"/>
@@ -6790,12 +6756,6 @@
             <a:r>
               <a:rPr lang="en-US" dirty="0"/>
               <a:t>git status</a:t>
-            </a:r>
-          </a:p>
-          <a:p>
-            <a:r>
-              <a:rPr lang="en-US" dirty="0"/>
-              <a:t>git log</a:t>
             </a:r>
           </a:p>
         </p:txBody>
@@ -6814,8 +6774,8 @@
         </p:nvSpPr>
         <p:spPr>
           <a:xfrm>
-            <a:off x="2083430" y="3957053"/>
-            <a:ext cx="7796539" cy="2031325"/>
+            <a:off x="2087176" y="3957053"/>
+            <a:ext cx="9007594" cy="2031325"/>
           </a:xfrm>
           <a:prstGeom prst="rect">
             <a:avLst/>
@@ -6827,7 +6787,7 @@
           </a:solidFill>
         </p:spPr>
         <p:txBody>
-          <a:bodyPr wrap="square" rtlCol="0">
+          <a:bodyPr wrap="none" rtlCol="0">
             <a:spAutoFit/>
           </a:bodyPr>
           <a:lstStyle/>
@@ -6854,15 +6814,23 @@
                 <a:solidFill>
                   <a:schemeClr val="bg1"/>
                 </a:solidFill>
+                <a:latin typeface="Courier" pitchFamily="2" charset="0"/>
               </a:rPr>
               <a:t>No commits yet</a:t>
             </a:r>
-          </a:p>
-          <a:p>
+            <a:br>
+              <a:rPr lang="en-US" dirty="0">
+                <a:solidFill>
+                  <a:schemeClr val="bg1"/>
+                </a:solidFill>
+                <a:latin typeface="Courier" pitchFamily="2" charset="0"/>
+              </a:rPr>
+            </a:br>
             <a:endParaRPr lang="en-US" dirty="0">
               <a:solidFill>
                 <a:schemeClr val="bg1"/>
               </a:solidFill>
+              <a:latin typeface="Courier" pitchFamily="2" charset="0"/>
             </a:endParaRPr>
           </a:p>
           <a:p>
@@ -6871,8 +6839,9 @@
                 <a:solidFill>
                   <a:schemeClr val="bg1"/>
                 </a:solidFill>
+                <a:latin typeface="Courier" pitchFamily="2" charset="0"/>
               </a:rPr>
-              <a:t>Changes to be committed:</a:t>
+              <a:t>Untracked files:</a:t>
             </a:r>
           </a:p>
           <a:p>
@@ -6881,47 +6850,26 @@
                 <a:solidFill>
                   <a:schemeClr val="bg1"/>
                 </a:solidFill>
+                <a:latin typeface="Courier" pitchFamily="2" charset="0"/>
               </a:rPr>
-              <a:t>  (use "git rm --cached &lt;file&gt;..." to </a:t>
-            </a:r>
+              <a:t>  (use "git add &lt;file&gt;..." to include in what will be committed)</a:t>
+            </a:r>
+          </a:p>
+          <a:p>
             <a:r>
               <a:rPr lang="en-US" dirty="0" err="1">
                 <a:solidFill>
-                  <a:schemeClr val="bg1"/>
+                  <a:srgbClr val="FF0000"/>
                 </a:solidFill>
-              </a:rPr>
-              <a:t>unstage</a:t>
-            </a:r>
-            <a:r>
-              <a:rPr lang="en-US" dirty="0">
-                <a:solidFill>
-                  <a:schemeClr val="bg1"/>
-                </a:solidFill>
-              </a:rPr>
-              <a:t>)</a:t>
-            </a:r>
-          </a:p>
-          <a:p>
-            <a:r>
-              <a:rPr lang="en-US" dirty="0">
-                <a:solidFill>
-                  <a:srgbClr val="00B050"/>
-                </a:solidFill>
-              </a:rPr>
-              <a:t>new file:   </a:t>
-            </a:r>
-            <a:r>
-              <a:rPr lang="en-US" dirty="0" err="1">
-                <a:solidFill>
-                  <a:srgbClr val="00B050"/>
-                </a:solidFill>
+                <a:latin typeface="Courier" pitchFamily="2" charset="0"/>
               </a:rPr>
               <a:t>file.txt</a:t>
             </a:r>
             <a:endParaRPr lang="en-US" dirty="0">
               <a:solidFill>
-                <a:srgbClr val="00B050"/>
+                <a:srgbClr val="FF0000"/>
               </a:solidFill>
+              <a:latin typeface="Courier" pitchFamily="2" charset="0"/>
             </a:endParaRPr>
           </a:p>
         </p:txBody>
@@ -6929,7 +6877,7 @@
     </p:spTree>
     <p:extLst>
       <p:ext uri="{BB962C8B-B14F-4D97-AF65-F5344CB8AC3E}">
-        <p14:creationId xmlns:p14="http://schemas.microsoft.com/office/powerpoint/2010/main" val="3833154408"/>
+        <p14:creationId xmlns:p14="http://schemas.microsoft.com/office/powerpoint/2010/main" val="337593047"/>
       </p:ext>
     </p:extLst>
   </p:cSld>
@@ -7002,32 +6950,31 @@
         </p:nvSpPr>
         <p:spPr>
           <a:xfrm>
-            <a:off x="2773599" y="1806572"/>
-            <a:ext cx="7796540" cy="3154713"/>
+            <a:off x="2773599" y="2303576"/>
+            <a:ext cx="7796540" cy="1456894"/>
           </a:xfrm>
         </p:spPr>
         <p:txBody>
           <a:bodyPr>
-            <a:normAutofit/>
+            <a:normAutofit fontScale="92500" lnSpcReduction="10000"/>
           </a:bodyPr>
           <a:lstStyle/>
           <a:p>
             <a:r>
               <a:rPr lang="en-US" dirty="0"/>
-              <a:t>git commit –m “at last a commit!”</a:t>
-            </a:r>
+              <a:t>git add </a:t>
+            </a:r>
+            <a:r>
+              <a:rPr lang="en-US" dirty="0" err="1"/>
+              <a:t>file.txt</a:t>
+            </a:r>
+            <a:endParaRPr lang="en-US" dirty="0"/>
           </a:p>
           <a:p>
             <a:r>
               <a:rPr lang="en-US" dirty="0"/>
               <a:t>git status</a:t>
             </a:r>
-          </a:p>
-          <a:p>
-            <a:endParaRPr lang="en-US" dirty="0"/>
-          </a:p>
-          <a:p>
-            <a:endParaRPr lang="en-US" dirty="0"/>
           </a:p>
           <a:p>
             <a:r>
@@ -7051,8 +6998,8 @@
         </p:nvSpPr>
         <p:spPr>
           <a:xfrm>
-            <a:off x="2093986" y="3145750"/>
-            <a:ext cx="7796539" cy="646331"/>
+            <a:off x="2083430" y="3957053"/>
+            <a:ext cx="7796539" cy="2031325"/>
           </a:xfrm>
           <a:prstGeom prst="rect">
             <a:avLst/>
@@ -7079,48 +7026,29 @@
             </a:r>
           </a:p>
           <a:p>
+            <a:endParaRPr lang="en-US" dirty="0">
+              <a:solidFill>
+                <a:schemeClr val="bg1"/>
+              </a:solidFill>
+            </a:endParaRPr>
+          </a:p>
+          <a:p>
             <a:r>
               <a:rPr lang="en-US" dirty="0">
                 <a:solidFill>
                   <a:schemeClr val="bg1"/>
                 </a:solidFill>
               </a:rPr>
-              <a:t>nothing to commit, working tree clean</a:t>
-            </a:r>
-          </a:p>
-        </p:txBody>
-      </p:sp>
-      <p:sp>
-        <p:nvSpPr>
-          <p:cNvPr id="5" name="TextBox 4">
-            <a:extLst>
-              <a:ext uri="{FF2B5EF4-FFF2-40B4-BE49-F238E27FC236}">
-                <a16:creationId xmlns:a16="http://schemas.microsoft.com/office/drawing/2014/main" id="{6087F7EF-2281-6A4E-B25C-73499F475265}"/>
-              </a:ext>
-            </a:extLst>
-          </p:cNvPr>
-          <p:cNvSpPr txBox="1"/>
-          <p:nvPr/>
-        </p:nvSpPr>
-        <p:spPr>
-          <a:xfrm>
-            <a:off x="2093986" y="4837552"/>
-            <a:ext cx="7796539" cy="1200329"/>
-          </a:xfrm>
-          <a:prstGeom prst="rect">
-            <a:avLst/>
-          </a:prstGeom>
-          <a:solidFill>
-            <a:schemeClr val="tx1">
-              <a:lumMod val="95000"/>
-            </a:schemeClr>
-          </a:solidFill>
-        </p:spPr>
-        <p:txBody>
-          <a:bodyPr wrap="square" rtlCol="0">
-            <a:spAutoFit/>
-          </a:bodyPr>
-          <a:lstStyle/>
+              <a:t>No commits yet</a:t>
+            </a:r>
+          </a:p>
+          <a:p>
+            <a:endParaRPr lang="en-US" dirty="0">
+              <a:solidFill>
+                <a:schemeClr val="bg1"/>
+              </a:solidFill>
+            </a:endParaRPr>
+          </a:p>
           <a:p>
             <a:r>
               <a:rPr lang="en-US" dirty="0">
@@ -7128,7 +7056,7 @@
                   <a:schemeClr val="bg1"/>
                 </a:solidFill>
               </a:rPr>
-              <a:t>Author: gtjames &lt;gtjames@gmail.com&gt;</a:t>
+              <a:t>Changes to be committed:</a:t>
             </a:r>
           </a:p>
           <a:p>
@@ -7138,37 +7066,54 @@
                   <a:schemeClr val="bg1"/>
                 </a:solidFill>
               </a:rPr>
-              <a:t>Date:   Thu Sep 2 14:02:04 2021 -0500</a:t>
-            </a:r>
-            <a:br>
+              <a:t>  (use "git rm --cached &lt;file&gt;..." to </a:t>
+            </a:r>
+            <a:r>
+              <a:rPr lang="en-US" dirty="0" err="1">
+                <a:solidFill>
+                  <a:schemeClr val="bg1"/>
+                </a:solidFill>
+              </a:rPr>
+              <a:t>unstage</a:t>
+            </a:r>
+            <a:r>
               <a:rPr lang="en-US" dirty="0">
                 <a:solidFill>
                   <a:schemeClr val="bg1"/>
                 </a:solidFill>
               </a:rPr>
-            </a:br>
+              <a:t>)</a:t>
+            </a:r>
+          </a:p>
+          <a:p>
+            <a:r>
+              <a:rPr lang="en-US" dirty="0">
+                <a:solidFill>
+                  <a:srgbClr val="00B050"/>
+                </a:solidFill>
+              </a:rPr>
+              <a:t>new file:   </a:t>
+            </a:r>
+            <a:r>
+              <a:rPr lang="en-US" dirty="0" err="1">
+                <a:solidFill>
+                  <a:srgbClr val="00B050"/>
+                </a:solidFill>
+              </a:rPr>
+              <a:t>file.txt</a:t>
+            </a:r>
             <a:endParaRPr lang="en-US" dirty="0">
               <a:solidFill>
-                <a:schemeClr val="bg1"/>
+                <a:srgbClr val="00B050"/>
               </a:solidFill>
             </a:endParaRPr>
-          </a:p>
-          <a:p>
-            <a:r>
-              <a:rPr lang="en-US" dirty="0">
-                <a:solidFill>
-                  <a:schemeClr val="bg1"/>
-                </a:solidFill>
-              </a:rPr>
-              <a:t>    at last a commit!</a:t>
-            </a:r>
           </a:p>
         </p:txBody>
       </p:sp>
     </p:spTree>
     <p:extLst>
       <p:ext uri="{BB962C8B-B14F-4D97-AF65-F5344CB8AC3E}">
-        <p14:creationId xmlns:p14="http://schemas.microsoft.com/office/powerpoint/2010/main" val="3008899978"/>
+        <p14:creationId xmlns:p14="http://schemas.microsoft.com/office/powerpoint/2010/main" val="3833154408"/>
       </p:ext>
     </p:extLst>
   </p:cSld>
@@ -7200,7 +7145,7 @@
           <p:cNvPr id="2" name="Title 1">
             <a:extLst>
               <a:ext uri="{FF2B5EF4-FFF2-40B4-BE49-F238E27FC236}">
-                <a16:creationId xmlns:a16="http://schemas.microsoft.com/office/drawing/2014/main" id="{614B41F9-A30D-BB44-A5A9-FEF1288DC4B7}"/>
+                <a16:creationId xmlns:a16="http://schemas.microsoft.com/office/drawing/2014/main" id="{676844CB-C481-014D-94DD-E32DA3745CA4}"/>
               </a:ext>
             </a:extLst>
           </p:cNvPr>
@@ -7218,14 +7163,7 @@
           <a:p>
             <a:r>
               <a:rPr lang="en-US" dirty="0"/>
-              <a:t>git add</a:t>
-            </a:r>
-            <a:br>
-              <a:rPr lang="en-US" dirty="0"/>
-            </a:br>
-            <a:r>
-              <a:rPr lang="en-US" dirty="0"/>
-              <a:t>Saving Changes</a:t>
+              <a:t>What is happening in the repo</a:t>
             </a:r>
           </a:p>
         </p:txBody>
@@ -7235,7 +7173,7 @@
           <p:cNvPr id="3" name="Content Placeholder 2">
             <a:extLst>
               <a:ext uri="{FF2B5EF4-FFF2-40B4-BE49-F238E27FC236}">
-                <a16:creationId xmlns:a16="http://schemas.microsoft.com/office/drawing/2014/main" id="{266A3526-15F2-EC4B-9F4E-8AE1B3F75AF0}"/>
+                <a16:creationId xmlns:a16="http://schemas.microsoft.com/office/drawing/2014/main" id="{EAAAC92D-6C1D-634B-B64D-87B2AB8FB901}"/>
               </a:ext>
             </a:extLst>
           </p:cNvPr>
@@ -7248,8 +7186,8 @@
         </p:nvSpPr>
         <p:spPr>
           <a:xfrm>
-            <a:off x="2773599" y="2052116"/>
-            <a:ext cx="7796540" cy="3262834"/>
+            <a:off x="2773599" y="1806572"/>
+            <a:ext cx="7796540" cy="3154713"/>
           </a:xfrm>
         </p:spPr>
         <p:txBody>
@@ -7260,49 +7198,161 @@
           <a:p>
             <a:r>
               <a:rPr lang="en-US" dirty="0"/>
-              <a:t>git add</a:t>
-            </a:r>
-          </a:p>
-          <a:p>
-            <a:pPr lvl="1"/>
-            <a:r>
-              <a:rPr lang="en-US" dirty="0"/>
-              <a:t>git add .		Adds all changed files in folder to staged</a:t>
-            </a:r>
-          </a:p>
-          <a:p>
-            <a:pPr lvl="1"/>
-            <a:r>
-              <a:rPr lang="en-US" dirty="0"/>
-              <a:t>git add </a:t>
-            </a:r>
-            <a:r>
-              <a:rPr lang="en-US" dirty="0" err="1"/>
-              <a:t>index.html</a:t>
-            </a:r>
-            <a:r>
-              <a:rPr lang="en-US" dirty="0"/>
-              <a:t>	adds just the single file to the staged list</a:t>
-            </a:r>
-          </a:p>
-          <a:p>
-            <a:r>
-              <a:rPr lang="en-US" dirty="0"/>
-              <a:t>The git add command adds a change in the working directory to the staging area. It tells git that you want to include updates to a particular file in the next commit.</a:t>
-            </a:r>
-          </a:p>
-          <a:p>
-            <a:pPr marL="0" indent="0">
-              <a:buNone/>
-            </a:pPr>
+              <a:t>git commit –m “at last a commit!”</a:t>
+            </a:r>
+          </a:p>
+          <a:p>
+            <a:r>
+              <a:rPr lang="en-US" dirty="0"/>
+              <a:t>git status</a:t>
+            </a:r>
+          </a:p>
+          <a:p>
             <a:endParaRPr lang="en-US" dirty="0"/>
+          </a:p>
+          <a:p>
+            <a:endParaRPr lang="en-US" dirty="0"/>
+          </a:p>
+          <a:p>
+            <a:r>
+              <a:rPr lang="en-US" dirty="0"/>
+              <a:t>git log</a:t>
+            </a:r>
+          </a:p>
+        </p:txBody>
+      </p:sp>
+      <p:sp>
+        <p:nvSpPr>
+          <p:cNvPr id="4" name="TextBox 3">
+            <a:extLst>
+              <a:ext uri="{FF2B5EF4-FFF2-40B4-BE49-F238E27FC236}">
+                <a16:creationId xmlns:a16="http://schemas.microsoft.com/office/drawing/2014/main" id="{2829EE56-DF2C-3542-AA1C-27A696AAEA95}"/>
+              </a:ext>
+            </a:extLst>
+          </p:cNvPr>
+          <p:cNvSpPr txBox="1"/>
+          <p:nvPr/>
+        </p:nvSpPr>
+        <p:spPr>
+          <a:xfrm>
+            <a:off x="2093986" y="3145750"/>
+            <a:ext cx="7796539" cy="646331"/>
+          </a:xfrm>
+          <a:prstGeom prst="rect">
+            <a:avLst/>
+          </a:prstGeom>
+          <a:solidFill>
+            <a:schemeClr val="tx1">
+              <a:lumMod val="95000"/>
+            </a:schemeClr>
+          </a:solidFill>
+        </p:spPr>
+        <p:txBody>
+          <a:bodyPr wrap="square" rtlCol="0">
+            <a:spAutoFit/>
+          </a:bodyPr>
+          <a:lstStyle/>
+          <a:p>
+            <a:r>
+              <a:rPr lang="en-US" dirty="0">
+                <a:solidFill>
+                  <a:schemeClr val="bg1"/>
+                </a:solidFill>
+              </a:rPr>
+              <a:t>On branch main</a:t>
+            </a:r>
+          </a:p>
+          <a:p>
+            <a:r>
+              <a:rPr lang="en-US" dirty="0">
+                <a:solidFill>
+                  <a:schemeClr val="bg1"/>
+                </a:solidFill>
+              </a:rPr>
+              <a:t>nothing to commit, working tree clean</a:t>
+            </a:r>
+          </a:p>
+        </p:txBody>
+      </p:sp>
+      <p:sp>
+        <p:nvSpPr>
+          <p:cNvPr id="5" name="TextBox 4">
+            <a:extLst>
+              <a:ext uri="{FF2B5EF4-FFF2-40B4-BE49-F238E27FC236}">
+                <a16:creationId xmlns:a16="http://schemas.microsoft.com/office/drawing/2014/main" id="{6087F7EF-2281-6A4E-B25C-73499F475265}"/>
+              </a:ext>
+            </a:extLst>
+          </p:cNvPr>
+          <p:cNvSpPr txBox="1"/>
+          <p:nvPr/>
+        </p:nvSpPr>
+        <p:spPr>
+          <a:xfrm>
+            <a:off x="2093986" y="4837552"/>
+            <a:ext cx="7796539" cy="1200329"/>
+          </a:xfrm>
+          <a:prstGeom prst="rect">
+            <a:avLst/>
+          </a:prstGeom>
+          <a:solidFill>
+            <a:schemeClr val="tx1">
+              <a:lumMod val="95000"/>
+            </a:schemeClr>
+          </a:solidFill>
+        </p:spPr>
+        <p:txBody>
+          <a:bodyPr wrap="square" rtlCol="0">
+            <a:spAutoFit/>
+          </a:bodyPr>
+          <a:lstStyle/>
+          <a:p>
+            <a:r>
+              <a:rPr lang="en-US" dirty="0">
+                <a:solidFill>
+                  <a:schemeClr val="bg1"/>
+                </a:solidFill>
+              </a:rPr>
+              <a:t>Author: gtjames &lt;gtjames@gmail.com&gt;</a:t>
+            </a:r>
+          </a:p>
+          <a:p>
+            <a:r>
+              <a:rPr lang="en-US" dirty="0">
+                <a:solidFill>
+                  <a:schemeClr val="bg1"/>
+                </a:solidFill>
+              </a:rPr>
+              <a:t>Date:   Thu Sep 2 14:02:04 2021 -0500</a:t>
+            </a:r>
+            <a:br>
+              <a:rPr lang="en-US" dirty="0">
+                <a:solidFill>
+                  <a:schemeClr val="bg1"/>
+                </a:solidFill>
+              </a:rPr>
+            </a:br>
+            <a:endParaRPr lang="en-US" dirty="0">
+              <a:solidFill>
+                <a:schemeClr val="bg1"/>
+              </a:solidFill>
+            </a:endParaRPr>
+          </a:p>
+          <a:p>
+            <a:r>
+              <a:rPr lang="en-US" dirty="0">
+                <a:solidFill>
+                  <a:schemeClr val="bg1"/>
+                </a:solidFill>
+              </a:rPr>
+              <a:t>    at last a commit!</a:t>
+            </a:r>
           </a:p>
         </p:txBody>
       </p:sp>
     </p:spTree>
     <p:extLst>
       <p:ext uri="{BB962C8B-B14F-4D97-AF65-F5344CB8AC3E}">
-        <p14:creationId xmlns:p14="http://schemas.microsoft.com/office/powerpoint/2010/main" val="3685084396"/>
+        <p14:creationId xmlns:p14="http://schemas.microsoft.com/office/powerpoint/2010/main" val="3008899978"/>
       </p:ext>
     </p:extLst>
   </p:cSld>
@@ -7334,7 +7384,7 @@
           <p:cNvPr id="2" name="Title 1">
             <a:extLst>
               <a:ext uri="{FF2B5EF4-FFF2-40B4-BE49-F238E27FC236}">
-                <a16:creationId xmlns:a16="http://schemas.microsoft.com/office/drawing/2014/main" id="{C836AACA-8E2A-C348-93A9-C09E9291DF54}"/>
+                <a16:creationId xmlns:a16="http://schemas.microsoft.com/office/drawing/2014/main" id="{614B41F9-A30D-BB44-A5A9-FEF1288DC4B7}"/>
               </a:ext>
             </a:extLst>
           </p:cNvPr>
@@ -7352,7 +7402,14 @@
           <a:p>
             <a:r>
               <a:rPr lang="en-US" dirty="0"/>
-              <a:t>We interrupt this lecture with an important status message</a:t>
+              <a:t>git add</a:t>
+            </a:r>
+            <a:br>
+              <a:rPr lang="en-US" dirty="0"/>
+            </a:br>
+            <a:r>
+              <a:rPr lang="en-US" dirty="0"/>
+              <a:t>Saving Changes</a:t>
             </a:r>
           </a:p>
         </p:txBody>
@@ -7362,7 +7419,7 @@
           <p:cNvPr id="3" name="Content Placeholder 2">
             <a:extLst>
               <a:ext uri="{FF2B5EF4-FFF2-40B4-BE49-F238E27FC236}">
-                <a16:creationId xmlns:a16="http://schemas.microsoft.com/office/drawing/2014/main" id="{5FFF3B11-BEAA-F348-AD0B-80FA6CCEB768}"/>
+                <a16:creationId xmlns:a16="http://schemas.microsoft.com/office/drawing/2014/main" id="{266A3526-15F2-EC4B-9F4E-8AE1B3F75AF0}"/>
               </a:ext>
             </a:extLst>
           </p:cNvPr>
@@ -7373,86 +7430,63 @@
             <p:ph idx="1"/>
           </p:nvPr>
         </p:nvSpPr>
-        <p:spPr/>
+        <p:spPr>
+          <a:xfrm>
+            <a:off x="2773599" y="2052116"/>
+            <a:ext cx="7796540" cy="3262834"/>
+          </a:xfrm>
+        </p:spPr>
         <p:txBody>
           <a:bodyPr>
-            <a:normAutofit fontScale="92500" lnSpcReduction="20000"/>
+            <a:normAutofit/>
           </a:bodyPr>
           <a:lstStyle/>
           <a:p>
             <a:r>
               <a:rPr lang="en-US" dirty="0"/>
-              <a:t>git status	what files are changed or add or new</a:t>
-            </a:r>
-          </a:p>
-          <a:p>
-            <a:r>
-              <a:rPr lang="en-US" dirty="0"/>
-              <a:t>git diff	 there we see the diff</a:t>
-            </a:r>
-          </a:p>
-          <a:p>
-            <a:r>
-              <a:rPr lang="en-US" dirty="0"/>
-              <a:t>git blame	Who wrote any line of code</a:t>
-            </a:r>
-          </a:p>
-          <a:p>
-            <a:r>
-              <a:rPr lang="en-US" dirty="0"/>
-              <a:t>git log	All commits</a:t>
-            </a:r>
-          </a:p>
-          <a:p>
-            <a:r>
-              <a:rPr lang="en-US" dirty="0"/>
-              <a:t>.</a:t>
+              <a:t>git add</a:t>
+            </a:r>
+          </a:p>
+          <a:p>
+            <a:pPr lvl="1"/>
+            <a:r>
+              <a:rPr lang="en-US" dirty="0"/>
+              <a:t>git add .		Adds all changed files in folder to staged</a:t>
+            </a:r>
+          </a:p>
+          <a:p>
+            <a:pPr lvl="1"/>
+            <a:r>
+              <a:rPr lang="en-US" dirty="0"/>
+              <a:t>git add </a:t>
             </a:r>
             <a:r>
               <a:rPr lang="en-US" dirty="0" err="1"/>
-              <a:t>gitignore</a:t>
-            </a:r>
+              <a:t>index.html</a:t>
+            </a:r>
+            <a:r>
+              <a:rPr lang="en-US" dirty="0"/>
+              <a:t>	adds just the single file to the staged list</a:t>
+            </a:r>
+          </a:p>
+          <a:p>
+            <a:r>
+              <a:rPr lang="en-US" dirty="0"/>
+              <a:t>The git add command adds a change in the working directory to the staging area. It tells git that you want to include updates to a particular file in the next commit.</a:t>
+            </a:r>
+          </a:p>
+          <a:p>
+            <a:pPr marL="0" indent="0">
+              <a:buNone/>
+            </a:pPr>
             <a:endParaRPr lang="en-US" dirty="0"/>
-          </a:p>
-          <a:p>
-            <a:pPr lvl="1"/>
-            <a:r>
-              <a:rPr lang="en-US" dirty="0"/>
-              <a:t>There are usually files created by the IDE you do not want to put in the repo. List the files and directories here</a:t>
-            </a:r>
-          </a:p>
-          <a:p>
-            <a:pPr lvl="1"/>
-            <a:r>
-              <a:rPr lang="en-US" dirty="0"/>
-              <a:t>https://</a:t>
-            </a:r>
-            <a:r>
-              <a:rPr lang="en-US" dirty="0" err="1"/>
-              <a:t>www.atlassian.com</a:t>
-            </a:r>
-            <a:r>
-              <a:rPr lang="en-US" dirty="0"/>
-              <a:t>/git/tutorials/saving-changes/</a:t>
-            </a:r>
-            <a:r>
-              <a:rPr lang="en-US" dirty="0" err="1"/>
-              <a:t>gitignore</a:t>
-            </a:r>
-            <a:endParaRPr lang="en-US" dirty="0"/>
-          </a:p>
-          <a:p>
-            <a:r>
-              <a:rPr lang="en-US" dirty="0"/>
-              <a:t>Back to our regularly scheduled broadcast</a:t>
-            </a:r>
           </a:p>
         </p:txBody>
       </p:sp>
     </p:spTree>
     <p:extLst>
       <p:ext uri="{BB962C8B-B14F-4D97-AF65-F5344CB8AC3E}">
-        <p14:creationId xmlns:p14="http://schemas.microsoft.com/office/powerpoint/2010/main" val="3821415748"/>
+        <p14:creationId xmlns:p14="http://schemas.microsoft.com/office/powerpoint/2010/main" val="3685084396"/>
       </p:ext>
     </p:extLst>
   </p:cSld>
@@ -7484,7 +7518,7 @@
           <p:cNvPr id="2" name="Title 1">
             <a:extLst>
               <a:ext uri="{FF2B5EF4-FFF2-40B4-BE49-F238E27FC236}">
-                <a16:creationId xmlns:a16="http://schemas.microsoft.com/office/drawing/2014/main" id="{8F585799-AC66-D94C-A912-340D781B9CD3}"/>
+                <a16:creationId xmlns:a16="http://schemas.microsoft.com/office/drawing/2014/main" id="{C836AACA-8E2A-C348-93A9-C09E9291DF54}"/>
               </a:ext>
             </a:extLst>
           </p:cNvPr>
@@ -7502,12 +7536,8 @@
           <a:p>
             <a:r>
               <a:rPr lang="en-US" dirty="0"/>
-              <a:t>git commit</a:t>
-            </a:r>
-            <a:br>
-              <a:rPr lang="en-US" dirty="0"/>
-            </a:br>
-            <a:endParaRPr lang="en-US" dirty="0"/>
+              <a:t>We interrupt this lecture with an important status message</a:t>
+            </a:r>
           </a:p>
         </p:txBody>
       </p:sp>
@@ -7516,7 +7546,7 @@
           <p:cNvPr id="3" name="Content Placeholder 2">
             <a:extLst>
               <a:ext uri="{FF2B5EF4-FFF2-40B4-BE49-F238E27FC236}">
-                <a16:creationId xmlns:a16="http://schemas.microsoft.com/office/drawing/2014/main" id="{2B027A93-50CA-FD46-9981-4BD3D5AB4E59}"/>
+                <a16:creationId xmlns:a16="http://schemas.microsoft.com/office/drawing/2014/main" id="{5FFF3B11-BEAA-F348-AD0B-80FA6CCEB768}"/>
               </a:ext>
             </a:extLst>
           </p:cNvPr>
@@ -7530,53 +7560,83 @@
         <p:spPr/>
         <p:txBody>
           <a:bodyPr>
-            <a:normAutofit/>
+            <a:normAutofit fontScale="92500" lnSpcReduction="20000"/>
           </a:bodyPr>
           <a:lstStyle/>
           <a:p>
-            <a:pPr fontAlgn="t"/>
-            <a:r>
-              <a:rPr lang="en-US" dirty="0"/>
-              <a:t>git commit -m "commit message”</a:t>
-            </a:r>
-          </a:p>
-          <a:p>
-            <a:pPr lvl="1" fontAlgn="t"/>
-            <a:r>
-              <a:rPr lang="en-US" dirty="0"/>
-              <a:t>Don’t go cheap on the message!!</a:t>
-            </a:r>
-          </a:p>
-          <a:p>
-            <a:pPr fontAlgn="t"/>
-            <a:r>
-              <a:rPr lang="en-US" dirty="0"/>
-              <a:t>The git commit command captures a snapshot of the project's currently staged changes. </a:t>
-            </a:r>
-          </a:p>
-          <a:p>
-            <a:pPr fontAlgn="t"/>
-            <a:r>
-              <a:rPr lang="en-US" dirty="0"/>
-              <a:t>Committed snapshots can be thought of as “safe” versions of a project. Prior to the execution of git commit,.</a:t>
-            </a:r>
-          </a:p>
-          <a:p>
-            <a:pPr fontAlgn="t"/>
-            <a:r>
-              <a:rPr lang="en-US" dirty="0"/>
-              <a:t>git records the entire contents of each file in every commit</a:t>
-            </a:r>
-          </a:p>
-          <a:p>
+            <a:r>
+              <a:rPr lang="en-US" dirty="0"/>
+              <a:t>git status	what files are changed or added or new</a:t>
+            </a:r>
+          </a:p>
+          <a:p>
+            <a:r>
+              <a:rPr lang="en-US" dirty="0"/>
+              <a:t>git diff	 there we see the diff</a:t>
+            </a:r>
+          </a:p>
+          <a:p>
+            <a:r>
+              <a:rPr lang="en-US" dirty="0"/>
+              <a:t>git blame	Who wrote any line of code</a:t>
+            </a:r>
+          </a:p>
+          <a:p>
+            <a:r>
+              <a:rPr lang="en-US" dirty="0"/>
+              <a:t>git log	All commits</a:t>
+            </a:r>
+          </a:p>
+          <a:p>
+            <a:r>
+              <a:rPr lang="en-US" dirty="0"/>
+              <a:t>.</a:t>
+            </a:r>
+            <a:r>
+              <a:rPr lang="en-US" dirty="0" err="1"/>
+              <a:t>gitignore</a:t>
+            </a:r>
             <a:endParaRPr lang="en-US" dirty="0"/>
+          </a:p>
+          <a:p>
+            <a:pPr lvl="1"/>
+            <a:r>
+              <a:rPr lang="en-US" dirty="0"/>
+              <a:t>There are usually files created by the IDE you do not want to put in the repo. List the files and directories here</a:t>
+            </a:r>
+          </a:p>
+          <a:p>
+            <a:pPr lvl="1"/>
+            <a:r>
+              <a:rPr lang="en-US" dirty="0"/>
+              <a:t>https://</a:t>
+            </a:r>
+            <a:r>
+              <a:rPr lang="en-US" dirty="0" err="1"/>
+              <a:t>www.atlassian.com</a:t>
+            </a:r>
+            <a:r>
+              <a:rPr lang="en-US" dirty="0"/>
+              <a:t>/git/tutorials/saving-changes/</a:t>
+            </a:r>
+            <a:r>
+              <a:rPr lang="en-US" dirty="0" err="1"/>
+              <a:t>gitignore</a:t>
+            </a:r>
+            <a:endParaRPr lang="en-US" dirty="0"/>
+          </a:p>
+          <a:p>
+            <a:r>
+              <a:rPr lang="en-US" dirty="0"/>
+              <a:t>Back to our regularly scheduled broadcast</a:t>
+            </a:r>
           </a:p>
         </p:txBody>
       </p:sp>
     </p:spTree>
     <p:extLst>
       <p:ext uri="{BB962C8B-B14F-4D97-AF65-F5344CB8AC3E}">
-        <p14:creationId xmlns:p14="http://schemas.microsoft.com/office/powerpoint/2010/main" val="1059115849"/>
+        <p14:creationId xmlns:p14="http://schemas.microsoft.com/office/powerpoint/2010/main" val="3821415748"/>
       </p:ext>
     </p:extLst>
   </p:cSld>
@@ -7608,7 +7668,7 @@
           <p:cNvPr id="2" name="Title 1">
             <a:extLst>
               <a:ext uri="{FF2B5EF4-FFF2-40B4-BE49-F238E27FC236}">
-                <a16:creationId xmlns:a16="http://schemas.microsoft.com/office/drawing/2014/main" id="{58277389-1BD4-C447-B613-C9CAF3BCD1B6}"/>
+                <a16:creationId xmlns:a16="http://schemas.microsoft.com/office/drawing/2014/main" id="{8F585799-AC66-D94C-A912-340D781B9CD3}"/>
               </a:ext>
             </a:extLst>
           </p:cNvPr>
@@ -7626,8 +7686,12 @@
           <a:p>
             <a:r>
               <a:rPr lang="en-US" dirty="0"/>
-              <a:t>Handy Commands</a:t>
-            </a:r>
+              <a:t>git commit</a:t>
+            </a:r>
+            <a:br>
+              <a:rPr lang="en-US" dirty="0"/>
+            </a:br>
+            <a:endParaRPr lang="en-US" dirty="0"/>
           </a:p>
         </p:txBody>
       </p:sp>
@@ -7636,7 +7700,7 @@
           <p:cNvPr id="3" name="Content Placeholder 2">
             <a:extLst>
               <a:ext uri="{FF2B5EF4-FFF2-40B4-BE49-F238E27FC236}">
-                <a16:creationId xmlns:a16="http://schemas.microsoft.com/office/drawing/2014/main" id="{79742A86-2B8B-7040-B01F-03DBC7894348}"/>
+                <a16:creationId xmlns:a16="http://schemas.microsoft.com/office/drawing/2014/main" id="{2B027A93-50CA-FD46-9981-4BD3D5AB4E59}"/>
               </a:ext>
             </a:extLst>
           </p:cNvPr>
@@ -7649,67 +7713,78 @@
         </p:nvSpPr>
         <p:spPr/>
         <p:txBody>
-          <a:bodyPr/>
-          <a:lstStyle/>
-          <a:p>
-            <a:r>
-              <a:rPr lang="en-US" dirty="0"/>
-              <a:t>git </a:t>
-            </a:r>
-            <a:r>
-              <a:rPr lang="en-US" dirty="0" err="1"/>
-              <a:t>init</a:t>
-            </a:r>
-            <a:r>
-              <a:rPr lang="en-US" dirty="0"/>
-              <a:t> my-new-branch</a:t>
-            </a:r>
-          </a:p>
-          <a:p>
-            <a:pPr lvl="1"/>
-            <a:r>
-              <a:rPr lang="en-US" dirty="0"/>
-              <a:t>Create a new folder and initialize a repo</a:t>
-            </a:r>
-          </a:p>
-          <a:p>
-            <a:pPr lvl="1"/>
-            <a:r>
-              <a:rPr lang="en-US" dirty="0"/>
-              <a:t>ls –la my-new-branch	 to see all that is created and </a:t>
-            </a:r>
-            <a:r>
-              <a:rPr lang="en-US" i="1" dirty="0"/>
-              <a:t>hidden</a:t>
-            </a:r>
+          <a:bodyPr>
+            <a:normAutofit/>
+          </a:bodyPr>
+          <a:lstStyle/>
+          <a:p>
+            <a:pPr fontAlgn="t"/>
+            <a:r>
+              <a:rPr lang="en-US" dirty="0">
+                <a:solidFill>
+                  <a:schemeClr val="tx2">
+                    <a:lumMod val="75000"/>
+                  </a:schemeClr>
+                </a:solidFill>
+              </a:rPr>
+              <a:t>git commit </a:t>
+            </a:r>
+            <a:r>
+              <a:rPr lang="en-US" dirty="0"/>
+              <a:t>-m "commit message”</a:t>
+            </a:r>
+          </a:p>
+          <a:p>
+            <a:pPr lvl="1" fontAlgn="t"/>
+            <a:r>
+              <a:rPr lang="en-US" dirty="0"/>
+              <a:t>Don’t go cheap on the message!!</a:t>
+            </a:r>
+          </a:p>
+          <a:p>
+            <a:pPr fontAlgn="t"/>
+            <a:r>
+              <a:rPr lang="en-US" dirty="0"/>
+              <a:t>The </a:t>
+            </a:r>
+            <a:r>
+              <a:rPr lang="en-US" dirty="0">
+                <a:solidFill>
+                  <a:schemeClr val="tx2">
+                    <a:lumMod val="75000"/>
+                  </a:schemeClr>
+                </a:solidFill>
+              </a:rPr>
+              <a:t>git commit </a:t>
+            </a:r>
+            <a:r>
+              <a:rPr lang="en-US" dirty="0"/>
+              <a:t>command captures a snapshot of the project's currently staged changes. </a:t>
+            </a:r>
+          </a:p>
+          <a:p>
+            <a:pPr fontAlgn="t"/>
+            <a:r>
+              <a:rPr lang="en-US" dirty="0"/>
+              <a:t>Committed snapshots can be thought of as “safe” versions of a project. </a:t>
+            </a:r>
+          </a:p>
+          <a:p>
+            <a:pPr fontAlgn="t"/>
+            <a:r>
+              <a:rPr lang="en-US" dirty="0"/>
+              <a:t>git records the entire contents of each file in every commit</a:t>
+            </a:r>
+          </a:p>
+          <a:p>
             <a:endParaRPr lang="en-US" dirty="0"/>
-          </a:p>
-          <a:p>
-            <a:r>
-              <a:rPr lang="en-US" dirty="0"/>
-              <a:t>git branch –d &lt;branch-name&gt;</a:t>
-            </a:r>
-          </a:p>
-          <a:p>
-            <a:pPr lvl="1"/>
-            <a:r>
-              <a:rPr lang="en-US" dirty="0"/>
-              <a:t>Delete a branch</a:t>
-            </a:r>
-          </a:p>
-          <a:p>
-            <a:pPr lvl="1"/>
-            <a:r>
-              <a:rPr lang="en-US" dirty="0"/>
-              <a:t>Use –D to delete a branch with uncommitted work</a:t>
-            </a:r>
           </a:p>
         </p:txBody>
       </p:sp>
     </p:spTree>
     <p:extLst>
       <p:ext uri="{BB962C8B-B14F-4D97-AF65-F5344CB8AC3E}">
-        <p14:creationId xmlns:p14="http://schemas.microsoft.com/office/powerpoint/2010/main" val="1366835868"/>
+        <p14:creationId xmlns:p14="http://schemas.microsoft.com/office/powerpoint/2010/main" val="1059115849"/>
       </p:ext>
     </p:extLst>
   </p:cSld>
@@ -7741,7 +7816,7 @@
           <p:cNvPr id="2" name="Title 1">
             <a:extLst>
               <a:ext uri="{FF2B5EF4-FFF2-40B4-BE49-F238E27FC236}">
-                <a16:creationId xmlns:a16="http://schemas.microsoft.com/office/drawing/2014/main" id="{C39E5E55-A7E3-F642-ACC3-29F838E1A35A}"/>
+                <a16:creationId xmlns:a16="http://schemas.microsoft.com/office/drawing/2014/main" id="{58277389-1BD4-C447-B613-C9CAF3BCD1B6}"/>
               </a:ext>
             </a:extLst>
           </p:cNvPr>
@@ -7757,7 +7832,10 @@
           <a:bodyPr/>
           <a:lstStyle/>
           <a:p>
-            <a:endParaRPr lang="en-US"/>
+            <a:r>
+              <a:rPr lang="en-US" dirty="0"/>
+              <a:t>Handy Commands</a:t>
+            </a:r>
           </a:p>
         </p:txBody>
       </p:sp>
@@ -7766,7 +7844,7 @@
           <p:cNvPr id="3" name="Content Placeholder 2">
             <a:extLst>
               <a:ext uri="{FF2B5EF4-FFF2-40B4-BE49-F238E27FC236}">
-                <a16:creationId xmlns:a16="http://schemas.microsoft.com/office/drawing/2014/main" id="{6E64F95B-4A09-B541-B94D-C738832F85D5}"/>
+                <a16:creationId xmlns:a16="http://schemas.microsoft.com/office/drawing/2014/main" id="{79742A86-2B8B-7040-B01F-03DBC7894348}"/>
               </a:ext>
             </a:extLst>
           </p:cNvPr>
@@ -7783,145 +7861,96 @@
           <a:lstStyle/>
           <a:p>
             <a:r>
-              <a:rPr lang="en-US" b="1" dirty="0"/>
-              <a:t>echo "</a:t>
-            </a:r>
-            <a:r>
-              <a:rPr lang="en-US" dirty="0"/>
-              <a:t>Your Project Name</a:t>
-            </a:r>
-            <a:r>
-              <a:rPr lang="en-US" b="1" dirty="0"/>
-              <a:t>" &gt; </a:t>
-            </a:r>
-            <a:r>
-              <a:rPr lang="en-US" b="1" dirty="0" err="1"/>
-              <a:t>README.md</a:t>
-            </a:r>
-            <a:br>
-              <a:rPr lang="en-US" b="1" dirty="0"/>
-            </a:br>
-            <a:r>
-              <a:rPr lang="en-US" b="1" dirty="0"/>
-              <a:t>// echo </a:t>
-            </a:r>
-            <a:r>
-              <a:rPr lang="en-US" b="1" dirty="0" err="1"/>
-              <a:t>node_modules</a:t>
-            </a:r>
-            <a:r>
-              <a:rPr lang="en-US" b="1" dirty="0"/>
-              <a:t> &gt; .</a:t>
-            </a:r>
-            <a:r>
-              <a:rPr lang="en-US" b="1" dirty="0" err="1"/>
-              <a:t>gitignore</a:t>
-            </a:r>
-            <a:br>
-              <a:rPr lang="en-US" b="1" dirty="0"/>
-            </a:br>
-            <a:r>
-              <a:rPr lang="en-US" b="1" dirty="0"/>
-              <a:t>git </a:t>
-            </a:r>
-            <a:r>
-              <a:rPr lang="en-US" b="1" dirty="0" err="1"/>
-              <a:t>init</a:t>
-            </a:r>
-            <a:br>
-              <a:rPr lang="en-US" b="1" dirty="0"/>
-            </a:br>
-            <a:r>
-              <a:rPr lang="en-US" b="1" dirty="0"/>
-              <a:t>git add .</a:t>
-            </a:r>
-            <a:br>
-              <a:rPr lang="en-US" b="1" dirty="0"/>
-            </a:br>
-            <a:r>
-              <a:rPr lang="en-US" b="1" dirty="0"/>
-              <a:t>git commit -m "first commit"</a:t>
-            </a:r>
-            <a:br>
-              <a:rPr lang="en-US" b="1" dirty="0"/>
-            </a:br>
-            <a:r>
-              <a:rPr lang="en-US" b="1" dirty="0"/>
-              <a:t>git remote add </a:t>
-            </a:r>
-            <a:r>
-              <a:rPr lang="en-US" b="1" dirty="0">
-                <a:highlight>
-                  <a:srgbClr val="FF0000"/>
-                </a:highlight>
-              </a:rPr>
-              <a:t>origin</a:t>
-            </a:r>
-            <a:r>
-              <a:rPr lang="en-US" b="1" dirty="0"/>
-              <a:t> https://</a:t>
-            </a:r>
-            <a:r>
-              <a:rPr lang="en-US" b="1" dirty="0" err="1"/>
-              <a:t>github.com</a:t>
-            </a:r>
-            <a:r>
-              <a:rPr lang="en-US" b="1" dirty="0"/>
-              <a:t>/</a:t>
-            </a:r>
-            <a:r>
-              <a:rPr lang="en-US" b="1" dirty="0" err="1">
-                <a:solidFill>
-                  <a:srgbClr val="FFC000"/>
-                </a:solidFill>
-              </a:rPr>
-              <a:t>yourID</a:t>
-            </a:r>
-            <a:r>
-              <a:rPr lang="en-US" b="1" dirty="0"/>
-              <a:t>/</a:t>
-            </a:r>
-            <a:r>
-              <a:rPr lang="en-US" b="1" dirty="0" err="1">
+              <a:rPr lang="en-US" dirty="0">
                 <a:solidFill>
                   <a:schemeClr val="tx2">
-                    <a:lumMod val="50000"/>
+                    <a:lumMod val="75000"/>
                   </a:schemeClr>
                 </a:solidFill>
               </a:rPr>
-              <a:t>YourProject</a:t>
-            </a:r>
-            <a:r>
-              <a:rPr lang="en-US" b="1" dirty="0" err="1"/>
-              <a:t>.git</a:t>
-            </a:r>
-            <a:br>
-              <a:rPr lang="en-US" b="1" dirty="0"/>
-            </a:br>
-            <a:r>
-              <a:rPr lang="en-US" b="1" dirty="0"/>
-              <a:t>git push -u </a:t>
-            </a:r>
-            <a:r>
-              <a:rPr lang="en-US" b="1" dirty="0">
-                <a:highlight>
-                  <a:srgbClr val="FF0000"/>
-                </a:highlight>
+              <a:t>git </a:t>
+            </a:r>
+            <a:r>
+              <a:rPr lang="en-US" dirty="0" err="1">
+                <a:solidFill>
+                  <a:schemeClr val="tx2">
+                    <a:lumMod val="75000"/>
+                  </a:schemeClr>
+                </a:solidFill>
               </a:rPr>
-              <a:t>origin</a:t>
-            </a:r>
-            <a:r>
-              <a:rPr lang="en-US" b="1" dirty="0"/>
-              <a:t> master</a:t>
+              <a:t>init</a:t>
+            </a:r>
+            <a:r>
+              <a:rPr lang="en-US" dirty="0">
+                <a:solidFill>
+                  <a:schemeClr val="tx2">
+                    <a:lumMod val="75000"/>
+                  </a:schemeClr>
+                </a:solidFill>
+              </a:rPr>
+              <a:t> </a:t>
+            </a:r>
+            <a:r>
+              <a:rPr lang="en-US" dirty="0"/>
+              <a:t>my-new-branch</a:t>
+            </a:r>
+          </a:p>
+          <a:p>
+            <a:pPr lvl="1"/>
+            <a:r>
+              <a:rPr lang="en-US" dirty="0"/>
+              <a:t>Create a new folder and initialize a repo</a:t>
+            </a:r>
+          </a:p>
+          <a:p>
+            <a:pPr lvl="1"/>
+            <a:r>
+              <a:rPr lang="en-US" dirty="0">
+                <a:solidFill>
+                  <a:schemeClr val="accent3">
+                    <a:lumMod val="60000"/>
+                    <a:lumOff val="40000"/>
+                  </a:schemeClr>
+                </a:solidFill>
+              </a:rPr>
+              <a:t>ls –la my-new-branch</a:t>
+            </a:r>
+            <a:r>
+              <a:rPr lang="en-US" dirty="0"/>
+              <a:t>	 to see all that is created and </a:t>
+            </a:r>
+            <a:r>
+              <a:rPr lang="en-US" i="1" dirty="0"/>
+              <a:t>hidden</a:t>
             </a:r>
             <a:endParaRPr lang="en-US" dirty="0"/>
+          </a:p>
+          <a:p>
+            <a:r>
+              <a:rPr lang="en-US" dirty="0"/>
+              <a:t>git branch –d &lt;branch-name&gt;</a:t>
+            </a:r>
+          </a:p>
+          <a:p>
+            <a:pPr lvl="1"/>
+            <a:r>
+              <a:rPr lang="en-US" dirty="0"/>
+              <a:t>Delete a branch</a:t>
+            </a:r>
+          </a:p>
+          <a:p>
+            <a:pPr lvl="1"/>
+            <a:r>
+              <a:rPr lang="en-US" dirty="0"/>
+              <a:t>Use –D to delete a branch with uncommitted work</a:t>
+            </a:r>
           </a:p>
         </p:txBody>
       </p:sp>
     </p:spTree>
     <p:extLst>
       <p:ext uri="{BB962C8B-B14F-4D97-AF65-F5344CB8AC3E}">
-        <p14:creationId xmlns:p14="http://schemas.microsoft.com/office/powerpoint/2010/main" val="2342671868"/>
+        <p14:creationId xmlns:p14="http://schemas.microsoft.com/office/powerpoint/2010/main" val="1366835868"/>
       </p:ext>
     </p:extLst>
   </p:cSld>
@@ -7953,7 +7982,7 @@
           <p:cNvPr id="2" name="Title 1">
             <a:extLst>
               <a:ext uri="{FF2B5EF4-FFF2-40B4-BE49-F238E27FC236}">
-                <a16:creationId xmlns:a16="http://schemas.microsoft.com/office/drawing/2014/main" id="{3AD63DC4-0C66-CF44-BCAB-FE88E1CBD6A5}"/>
+                <a16:creationId xmlns:a16="http://schemas.microsoft.com/office/drawing/2014/main" id="{C39E5E55-A7E3-F642-ACC3-29F838E1A35A}"/>
               </a:ext>
             </a:extLst>
           </p:cNvPr>
@@ -7971,12 +8000,8 @@
           <a:p>
             <a:r>
               <a:rPr lang="en-US" dirty="0"/>
-              <a:t>git push</a:t>
-            </a:r>
-            <a:br>
-              <a:rPr lang="en-US" dirty="0"/>
-            </a:br>
-            <a:endParaRPr lang="en-US" dirty="0"/>
+              <a:t>In the root folder of your Project</a:t>
+            </a:r>
           </a:p>
         </p:txBody>
       </p:sp>
@@ -7985,7 +8010,7 @@
           <p:cNvPr id="3" name="Content Placeholder 2">
             <a:extLst>
               <a:ext uri="{FF2B5EF4-FFF2-40B4-BE49-F238E27FC236}">
-                <a16:creationId xmlns:a16="http://schemas.microsoft.com/office/drawing/2014/main" id="{EAD780A0-D40B-BB46-9951-1C1273041812}"/>
+                <a16:creationId xmlns:a16="http://schemas.microsoft.com/office/drawing/2014/main" id="{6E64F95B-4A09-B541-B94D-C738832F85D5}"/>
               </a:ext>
             </a:extLst>
           </p:cNvPr>
@@ -7996,37 +8021,172 @@
             <p:ph idx="1"/>
           </p:nvPr>
         </p:nvSpPr>
-        <p:spPr/>
-        <p:txBody>
-          <a:bodyPr/>
-          <a:lstStyle/>
-          <a:p>
-            <a:pPr fontAlgn="t"/>
-            <a:r>
-              <a:rPr lang="en-US" dirty="0"/>
-              <a:t>The git push command is used to upload local repository content to a remote repository. Pushing is how you transfer commits from your local repository to a remote repo.</a:t>
-            </a:r>
-          </a:p>
-          <a:p>
-            <a:pPr fontAlgn="t"/>
+        <p:spPr>
+          <a:xfrm>
+            <a:off x="2773599" y="2052116"/>
+            <a:ext cx="8449572" cy="3997828"/>
+          </a:xfrm>
+        </p:spPr>
+        <p:txBody>
+          <a:bodyPr>
+            <a:normAutofit/>
+          </a:bodyPr>
+          <a:lstStyle/>
+          <a:p>
+            <a:r>
+              <a:rPr lang="en-US" dirty="0"/>
+              <a:t>Step 0 create an empty repo on </a:t>
+            </a:r>
+            <a:r>
+              <a:rPr lang="en-US" dirty="0" err="1"/>
+              <a:t>github</a:t>
+            </a:r>
             <a:endParaRPr lang="en-US" dirty="0"/>
           </a:p>
           <a:p>
-            <a:pPr fontAlgn="t"/>
-            <a:r>
-              <a:rPr lang="en-US" dirty="0"/>
-              <a:t>git push is most commonly used to publish an upload local changes to a central repository. After a local repository has been modified a push is executed to share the modifications with remote team members.</a:t>
-            </a:r>
-          </a:p>
-          <a:p>
+            <a:pPr lvl="1"/>
             <a:endParaRPr lang="en-US" dirty="0"/>
+          </a:p>
+          <a:p>
+            <a:r>
+              <a:rPr lang="en-US" b="1" dirty="0"/>
+              <a:t>echo "</a:t>
+            </a:r>
+            <a:r>
+              <a:rPr lang="en-US" dirty="0"/>
+              <a:t>Your Project Name</a:t>
+            </a:r>
+            <a:r>
+              <a:rPr lang="en-US" b="1" dirty="0"/>
+              <a:t>" &gt; </a:t>
+            </a:r>
+            <a:r>
+              <a:rPr lang="en-US" b="1" dirty="0" err="1"/>
+              <a:t>README.md</a:t>
+            </a:r>
+            <a:br>
+              <a:rPr lang="en-US" b="1" dirty="0"/>
+            </a:br>
+            <a:r>
+              <a:rPr lang="en-US" b="1" dirty="0"/>
+              <a:t>// echo </a:t>
+            </a:r>
+            <a:r>
+              <a:rPr lang="en-US" b="1" dirty="0" err="1"/>
+              <a:t>node_modules</a:t>
+            </a:r>
+            <a:r>
+              <a:rPr lang="en-US" b="1" dirty="0"/>
+              <a:t> &gt; .</a:t>
+            </a:r>
+            <a:r>
+              <a:rPr lang="en-US" b="1" dirty="0" err="1"/>
+              <a:t>gitignore</a:t>
+            </a:r>
+            <a:br>
+              <a:rPr lang="en-US" b="1" dirty="0"/>
+            </a:br>
+            <a:r>
+              <a:rPr lang="en-US" b="1" dirty="0"/>
+              <a:t>git </a:t>
+            </a:r>
+            <a:r>
+              <a:rPr lang="en-US" b="1" dirty="0" err="1"/>
+              <a:t>init</a:t>
+            </a:r>
+            <a:br>
+              <a:rPr lang="en-US" b="1" dirty="0"/>
+            </a:br>
+            <a:r>
+              <a:rPr lang="en-US" b="1" dirty="0"/>
+              <a:t>git add .</a:t>
+            </a:r>
+            <a:br>
+              <a:rPr lang="en-US" b="1" dirty="0"/>
+            </a:br>
+            <a:r>
+              <a:rPr lang="en-US" b="1" dirty="0"/>
+              <a:t>git commit -m "first commit"</a:t>
+            </a:r>
+            <a:br>
+              <a:rPr lang="en-US" b="1" dirty="0"/>
+            </a:br>
+            <a:r>
+              <a:rPr lang="en-US" b="1" dirty="0"/>
+              <a:t>git remote add </a:t>
+            </a:r>
+            <a:r>
+              <a:rPr lang="en-US" b="1" dirty="0">
+                <a:highlight>
+                  <a:srgbClr val="FF0000"/>
+                </a:highlight>
+              </a:rPr>
+              <a:t>origin</a:t>
+            </a:r>
+            <a:r>
+              <a:rPr lang="en-US" b="1" dirty="0"/>
+              <a:t> https://</a:t>
+            </a:r>
+            <a:r>
+              <a:rPr lang="en-US" b="1" dirty="0" err="1"/>
+              <a:t>github.com</a:t>
+            </a:r>
+            <a:r>
+              <a:rPr lang="en-US" b="1" dirty="0"/>
+              <a:t>/</a:t>
+            </a:r>
+            <a:r>
+              <a:rPr lang="en-US" b="1" dirty="0" err="1">
+                <a:solidFill>
+                  <a:srgbClr val="FFC000"/>
+                </a:solidFill>
+              </a:rPr>
+              <a:t>yourID</a:t>
+            </a:r>
+            <a:r>
+              <a:rPr lang="en-US" b="1" dirty="0"/>
+              <a:t>/</a:t>
+            </a:r>
+            <a:r>
+              <a:rPr lang="en-US" b="1" dirty="0" err="1">
+                <a:solidFill>
+                  <a:schemeClr val="tx2">
+                    <a:lumMod val="50000"/>
+                  </a:schemeClr>
+                </a:solidFill>
+              </a:rPr>
+              <a:t>YourProject</a:t>
+            </a:r>
+            <a:r>
+              <a:rPr lang="en-US" b="1" dirty="0" err="1"/>
+              <a:t>.git</a:t>
+            </a:r>
+            <a:br>
+              <a:rPr lang="en-US" b="1" dirty="0"/>
+            </a:br>
+            <a:r>
+              <a:rPr lang="en-US" b="1" dirty="0"/>
+              <a:t>git push -u </a:t>
+            </a:r>
+            <a:r>
+              <a:rPr lang="en-US" b="1" dirty="0">
+                <a:highlight>
+                  <a:srgbClr val="FF0000"/>
+                </a:highlight>
+              </a:rPr>
+              <a:t>origin</a:t>
+            </a:r>
+            <a:r>
+              <a:rPr lang="en-US" b="1" dirty="0"/>
+              <a:t> main</a:t>
+            </a:r>
           </a:p>
         </p:txBody>
       </p:sp>
     </p:spTree>
     <p:extLst>
       <p:ext uri="{BB962C8B-B14F-4D97-AF65-F5344CB8AC3E}">
-        <p14:creationId xmlns:p14="http://schemas.microsoft.com/office/powerpoint/2010/main" val="4248173442"/>
+        <p14:creationId xmlns:p14="http://schemas.microsoft.com/office/powerpoint/2010/main" val="2342671868"/>
       </p:ext>
     </p:extLst>
   </p:cSld>
@@ -8058,7 +8218,7 @@
           <p:cNvPr id="2" name="Title 1">
             <a:extLst>
               <a:ext uri="{FF2B5EF4-FFF2-40B4-BE49-F238E27FC236}">
-                <a16:creationId xmlns:a16="http://schemas.microsoft.com/office/drawing/2014/main" id="{81D8D568-4A58-6B4A-B13E-35E21407DF5D}"/>
+                <a16:creationId xmlns:a16="http://schemas.microsoft.com/office/drawing/2014/main" id="{3AD63DC4-0C66-CF44-BCAB-FE88E1CBD6A5}"/>
               </a:ext>
             </a:extLst>
           </p:cNvPr>
@@ -8076,7 +8236,7 @@
           <a:p>
             <a:r>
               <a:rPr lang="en-US" dirty="0"/>
-              <a:t>git pull</a:t>
+              <a:t>git push</a:t>
             </a:r>
             <a:br>
               <a:rPr lang="en-US" dirty="0"/>
@@ -8090,7 +8250,7 @@
           <p:cNvPr id="3" name="Content Placeholder 2">
             <a:extLst>
               <a:ext uri="{FF2B5EF4-FFF2-40B4-BE49-F238E27FC236}">
-                <a16:creationId xmlns:a16="http://schemas.microsoft.com/office/drawing/2014/main" id="{6EB028AD-587E-DC4B-AC11-3B3B28F44107}"/>
+                <a16:creationId xmlns:a16="http://schemas.microsoft.com/office/drawing/2014/main" id="{EAD780A0-D40B-BB46-9951-1C1273041812}"/>
               </a:ext>
             </a:extLst>
           </p:cNvPr>
@@ -8103,40 +8263,35 @@
         </p:nvSpPr>
         <p:spPr/>
         <p:txBody>
-          <a:bodyPr>
-            <a:normAutofit/>
-          </a:bodyPr>
-          <a:lstStyle/>
-          <a:p>
-            <a:r>
-              <a:rPr lang="en-US" dirty="0"/>
-              <a:t>Used to fetch and download content from a remote repository </a:t>
-            </a:r>
-          </a:p>
-          <a:p>
-            <a:r>
-              <a:rPr lang="en-US" dirty="0"/>
-              <a:t>Updates the local repository to match that content. </a:t>
-            </a:r>
-          </a:p>
-          <a:p>
-            <a:r>
-              <a:rPr lang="en-US" dirty="0"/>
-              <a:t>Merging remote upstream changes into your local repository is a common task in git-based collaboration work flows. </a:t>
-            </a:r>
-          </a:p>
-          <a:p>
-            <a:r>
-              <a:rPr lang="en-US" dirty="0"/>
-              <a:t> It’s an easy way to synchronize your local repository with upstream changes.</a:t>
-            </a:r>
+          <a:bodyPr/>
+          <a:lstStyle/>
+          <a:p>
+            <a:pPr fontAlgn="t"/>
+            <a:r>
+              <a:rPr lang="en-US" dirty="0"/>
+              <a:t>The git push command is used to upload local repository content to a remote repository. Pushing is how you transfer commits from your local repository to a remote repo.</a:t>
+            </a:r>
+          </a:p>
+          <a:p>
+            <a:pPr fontAlgn="t"/>
+            <a:endParaRPr lang="en-US" dirty="0"/>
+          </a:p>
+          <a:p>
+            <a:pPr fontAlgn="t"/>
+            <a:r>
+              <a:rPr lang="en-US" dirty="0"/>
+              <a:t>git push is most commonly used to publish an upload local changes to a central repository. After a local repository has been modified a push is executed to share the modifications with remote team members.</a:t>
+            </a:r>
+          </a:p>
+          <a:p>
+            <a:endParaRPr lang="en-US" dirty="0"/>
           </a:p>
         </p:txBody>
       </p:sp>
     </p:spTree>
     <p:extLst>
       <p:ext uri="{BB962C8B-B14F-4D97-AF65-F5344CB8AC3E}">
-        <p14:creationId xmlns:p14="http://schemas.microsoft.com/office/powerpoint/2010/main" val="2654921309"/>
+        <p14:creationId xmlns:p14="http://schemas.microsoft.com/office/powerpoint/2010/main" val="4248173442"/>
       </p:ext>
     </p:extLst>
   </p:cSld>
@@ -8275,6 +8430,116 @@
           <p:cNvPr id="2" name="Title 1">
             <a:extLst>
               <a:ext uri="{FF2B5EF4-FFF2-40B4-BE49-F238E27FC236}">
+                <a16:creationId xmlns:a16="http://schemas.microsoft.com/office/drawing/2014/main" id="{81D8D568-4A58-6B4A-B13E-35E21407DF5D}"/>
+              </a:ext>
+            </a:extLst>
+          </p:cNvPr>
+          <p:cNvSpPr>
+            <a:spLocks noGrp="1"/>
+          </p:cNvSpPr>
+          <p:nvPr>
+            <p:ph type="title"/>
+          </p:nvPr>
+        </p:nvSpPr>
+        <p:spPr/>
+        <p:txBody>
+          <a:bodyPr/>
+          <a:lstStyle/>
+          <a:p>
+            <a:r>
+              <a:rPr lang="en-US" dirty="0"/>
+              <a:t>git pull</a:t>
+            </a:r>
+            <a:br>
+              <a:rPr lang="en-US" dirty="0"/>
+            </a:br>
+            <a:endParaRPr lang="en-US" dirty="0"/>
+          </a:p>
+        </p:txBody>
+      </p:sp>
+      <p:sp>
+        <p:nvSpPr>
+          <p:cNvPr id="3" name="Content Placeholder 2">
+            <a:extLst>
+              <a:ext uri="{FF2B5EF4-FFF2-40B4-BE49-F238E27FC236}">
+                <a16:creationId xmlns:a16="http://schemas.microsoft.com/office/drawing/2014/main" id="{6EB028AD-587E-DC4B-AC11-3B3B28F44107}"/>
+              </a:ext>
+            </a:extLst>
+          </p:cNvPr>
+          <p:cNvSpPr>
+            <a:spLocks noGrp="1"/>
+          </p:cNvSpPr>
+          <p:nvPr>
+            <p:ph idx="1"/>
+          </p:nvPr>
+        </p:nvSpPr>
+        <p:spPr/>
+        <p:txBody>
+          <a:bodyPr>
+            <a:normAutofit/>
+          </a:bodyPr>
+          <a:lstStyle/>
+          <a:p>
+            <a:r>
+              <a:rPr lang="en-US" dirty="0"/>
+              <a:t>Used to fetch and download content from a remote repository </a:t>
+            </a:r>
+          </a:p>
+          <a:p>
+            <a:r>
+              <a:rPr lang="en-US" dirty="0"/>
+              <a:t>Updates the local repository to match that content. </a:t>
+            </a:r>
+          </a:p>
+          <a:p>
+            <a:r>
+              <a:rPr lang="en-US" dirty="0"/>
+              <a:t>Merging remote upstream changes into your local repository is a common task in git-based collaboration work flows. </a:t>
+            </a:r>
+          </a:p>
+          <a:p>
+            <a:r>
+              <a:rPr lang="en-US" dirty="0"/>
+              <a:t> It’s an easy way to synchronize your local repository with upstream changes.</a:t>
+            </a:r>
+          </a:p>
+        </p:txBody>
+      </p:sp>
+    </p:spTree>
+    <p:extLst>
+      <p:ext uri="{BB962C8B-B14F-4D97-AF65-F5344CB8AC3E}">
+        <p14:creationId xmlns:p14="http://schemas.microsoft.com/office/powerpoint/2010/main" val="2654921309"/>
+      </p:ext>
+    </p:extLst>
+  </p:cSld>
+  <p:clrMapOvr>
+    <a:masterClrMapping/>
+  </p:clrMapOvr>
+</p:sld>
+</file>
+
+<file path=ppt/slides/slide31.xml><?xml version="1.0" encoding="utf-8"?>
+<p:sld xmlns:a="http://schemas.openxmlformats.org/drawingml/2006/main" xmlns:r="http://schemas.openxmlformats.org/officeDocument/2006/relationships" xmlns:p="http://schemas.openxmlformats.org/presentationml/2006/main">
+  <p:cSld>
+    <p:spTree>
+      <p:nvGrpSpPr>
+        <p:cNvPr id="1" name=""/>
+        <p:cNvGrpSpPr/>
+        <p:nvPr/>
+      </p:nvGrpSpPr>
+      <p:grpSpPr>
+        <a:xfrm>
+          <a:off x="0" y="0"/>
+          <a:ext cx="0" cy="0"/>
+          <a:chOff x="0" y="0"/>
+          <a:chExt cx="0" cy="0"/>
+        </a:xfrm>
+      </p:grpSpPr>
+      <p:sp>
+        <p:nvSpPr>
+          <p:cNvPr id="2" name="Title 1">
+            <a:extLst>
+              <a:ext uri="{FF2B5EF4-FFF2-40B4-BE49-F238E27FC236}">
                 <a16:creationId xmlns:a16="http://schemas.microsoft.com/office/drawing/2014/main" id="{5B66209D-486A-E14A-A78C-2C0B71A3A327}"/>
               </a:ext>
             </a:extLst>
@@ -9131,7 +9396,7 @@
           <p:cNvPr id="2" name="Title 1">
             <a:extLst>
               <a:ext uri="{FF2B5EF4-FFF2-40B4-BE49-F238E27FC236}">
-                <a16:creationId xmlns:a16="http://schemas.microsoft.com/office/drawing/2014/main" id="{4CAB6C18-2CCB-DF48-B552-20D85E9EA4A5}"/>
+                <a16:creationId xmlns:a16="http://schemas.microsoft.com/office/drawing/2014/main" id="{6D3EC896-B690-87A8-3EBF-54399C692C01}"/>
               </a:ext>
             </a:extLst>
           </p:cNvPr>
@@ -9149,7 +9414,7 @@
           <a:p>
             <a:r>
               <a:rPr lang="en-US" dirty="0"/>
-              <a:t>Repo</a:t>
+              <a:t>Main /Master</a:t>
             </a:r>
           </a:p>
         </p:txBody>
@@ -9159,7 +9424,7 @@
           <p:cNvPr id="3" name="Content Placeholder 2">
             <a:extLst>
               <a:ext uri="{FF2B5EF4-FFF2-40B4-BE49-F238E27FC236}">
-                <a16:creationId xmlns:a16="http://schemas.microsoft.com/office/drawing/2014/main" id="{3F33503D-C6A1-0E4D-93EE-1434CA08CDB3}"/>
+                <a16:creationId xmlns:a16="http://schemas.microsoft.com/office/drawing/2014/main" id="{8FD0516C-A416-07A5-C630-FC9B43AFA962}"/>
               </a:ext>
             </a:extLst>
           </p:cNvPr>
@@ -9170,61 +9435,19 @@
             <p:ph idx="1"/>
           </p:nvPr>
         </p:nvSpPr>
-        <p:spPr>
-          <a:xfrm>
-            <a:off x="2773599" y="2052116"/>
-            <a:ext cx="7796540" cy="2920600"/>
-          </a:xfrm>
-        </p:spPr>
+        <p:spPr/>
         <p:txBody>
           <a:bodyPr/>
           <a:lstStyle/>
           <a:p>
-            <a:r>
-              <a:rPr lang="en-US" dirty="0"/>
-              <a:t>Working </a:t>
-            </a:r>
-          </a:p>
-          <a:p>
-            <a:pPr lvl="1"/>
-            <a:r>
-              <a:rPr lang="en-US" dirty="0"/>
-              <a:t>Everyone has a full ‘working’ copy of the project</a:t>
-            </a:r>
-          </a:p>
-          <a:p>
-            <a:pPr lvl="1"/>
-            <a:r>
-              <a:rPr lang="en-US" dirty="0"/>
-              <a:t>Do all the damage you want and you don’t affect your team</a:t>
-            </a:r>
-          </a:p>
-          <a:p>
-            <a:r>
-              <a:rPr lang="en-US" dirty="0"/>
-              <a:t>Staging</a:t>
-            </a:r>
-          </a:p>
-          <a:p>
-            <a:pPr lvl="1"/>
-            <a:r>
-              <a:rPr lang="en-US" dirty="0"/>
-              <a:t>Your next draft of the project</a:t>
-            </a:r>
-          </a:p>
-          <a:p>
-            <a:pPr lvl="1"/>
-            <a:r>
-              <a:rPr lang="en-US" dirty="0"/>
-              <a:t>You have something you are happy with</a:t>
-            </a:r>
+            <a:endParaRPr lang="en-US"/>
           </a:p>
         </p:txBody>
       </p:sp>
     </p:spTree>
     <p:extLst>
       <p:ext uri="{BB962C8B-B14F-4D97-AF65-F5344CB8AC3E}">
-        <p14:creationId xmlns:p14="http://schemas.microsoft.com/office/powerpoint/2010/main" val="1228171922"/>
+        <p14:creationId xmlns:p14="http://schemas.microsoft.com/office/powerpoint/2010/main" val="3409439508"/>
       </p:ext>
     </p:extLst>
   </p:cSld>
@@ -9256,7 +9479,7 @@
           <p:cNvPr id="2" name="Title 1">
             <a:extLst>
               <a:ext uri="{FF2B5EF4-FFF2-40B4-BE49-F238E27FC236}">
-                <a16:creationId xmlns:a16="http://schemas.microsoft.com/office/drawing/2014/main" id="{137F8CFB-5F42-824B-BEB5-B5663AF82629}"/>
+                <a16:creationId xmlns:a16="http://schemas.microsoft.com/office/drawing/2014/main" id="{4CAB6C18-2CCB-DF48-B552-20D85E9EA4A5}"/>
               </a:ext>
             </a:extLst>
           </p:cNvPr>
@@ -9269,21 +9492,12 @@
         </p:nvSpPr>
         <p:spPr/>
         <p:txBody>
-          <a:bodyPr>
-            <a:normAutofit/>
-          </a:bodyPr>
-          <a:lstStyle/>
-          <a:p>
-            <a:r>
-              <a:rPr lang="en-US" dirty="0"/>
-              <a:t>Version Control System Attributes</a:t>
-            </a:r>
-            <a:br>
-              <a:rPr lang="en-US" dirty="0"/>
-            </a:br>
-            <a:r>
-              <a:rPr lang="en-US" sz="2400" dirty="0"/>
-              <a:t>Who do we blame</a:t>
+          <a:bodyPr/>
+          <a:lstStyle/>
+          <a:p>
+            <a:r>
+              <a:rPr lang="en-US"/>
+              <a:t>Git project</a:t>
             </a:r>
             <a:endParaRPr lang="en-US" dirty="0"/>
           </a:p>
@@ -9294,7 +9508,7 @@
           <p:cNvPr id="3" name="Content Placeholder 2">
             <a:extLst>
               <a:ext uri="{FF2B5EF4-FFF2-40B4-BE49-F238E27FC236}">
-                <a16:creationId xmlns:a16="http://schemas.microsoft.com/office/drawing/2014/main" id="{38F4BFAB-3820-0D4E-84FD-8C5B42BA75CC}"/>
+                <a16:creationId xmlns:a16="http://schemas.microsoft.com/office/drawing/2014/main" id="{3F33503D-C6A1-0E4D-93EE-1434CA08CDB3}"/>
               </a:ext>
             </a:extLst>
           </p:cNvPr>
@@ -9308,56 +9522,80 @@
         <p:spPr>
           <a:xfrm>
             <a:off x="2773599" y="2052116"/>
-            <a:ext cx="7796540" cy="2679904"/>
+            <a:ext cx="7796540" cy="3997828"/>
           </a:xfrm>
         </p:spPr>
         <p:txBody>
-          <a:bodyPr/>
-          <a:lstStyle/>
-          <a:p>
-            <a:r>
-              <a:rPr lang="en-US" dirty="0"/>
-              <a:t>Complete history of every change</a:t>
+          <a:bodyPr>
+            <a:normAutofit fontScale="92500" lnSpcReduction="10000"/>
+          </a:bodyPr>
+          <a:lstStyle/>
+          <a:p>
+            <a:r>
+              <a:rPr lang="en-US" dirty="0"/>
+              <a:t>Working </a:t>
             </a:r>
           </a:p>
           <a:p>
             <a:pPr lvl="1"/>
             <a:r>
               <a:rPr lang="en-US" dirty="0"/>
-              <a:t>Who</a:t>
+              <a:t>Everyone has a full ‘working’ copy of the project</a:t>
             </a:r>
           </a:p>
           <a:p>
             <a:pPr lvl="1"/>
             <a:r>
               <a:rPr lang="en-US" dirty="0"/>
-              <a:t>When</a:t>
+              <a:t>Do all the damage you want, and you don’t affect your team</a:t>
+            </a:r>
+          </a:p>
+          <a:p>
+            <a:r>
+              <a:rPr lang="en-US" dirty="0"/>
+              <a:t>Staging</a:t>
             </a:r>
           </a:p>
           <a:p>
             <a:pPr lvl="1"/>
             <a:r>
               <a:rPr lang="en-US" dirty="0"/>
-              <a:t>What</a:t>
+              <a:t>Your next draft of the project</a:t>
             </a:r>
           </a:p>
           <a:p>
             <a:pPr lvl="1"/>
             <a:r>
               <a:rPr lang="en-US" dirty="0"/>
-              <a:t>Why</a:t>
+              <a:t>You have something you are happy with</a:t>
+            </a:r>
+          </a:p>
+          <a:p>
+            <a:r>
+              <a:rPr lang="en-US" dirty="0"/>
+              <a:t>Repo</a:t>
             </a:r>
           </a:p>
           <a:p>
             <a:pPr lvl="1"/>
-            <a:endParaRPr lang="en-US" dirty="0"/>
+            <a:r>
+              <a:rPr lang="en-US" dirty="0"/>
+              <a:t>The final word</a:t>
+            </a:r>
+          </a:p>
+          <a:p>
+            <a:pPr lvl="1"/>
+            <a:r>
+              <a:rPr lang="en-US" dirty="0"/>
+              <a:t>Hosts the latest and greatest version of everyone’s code</a:t>
+            </a:r>
           </a:p>
         </p:txBody>
       </p:sp>
     </p:spTree>
     <p:extLst>
       <p:ext uri="{BB962C8B-B14F-4D97-AF65-F5344CB8AC3E}">
-        <p14:creationId xmlns:p14="http://schemas.microsoft.com/office/powerpoint/2010/main" val="3352238849"/>
+        <p14:creationId xmlns:p14="http://schemas.microsoft.com/office/powerpoint/2010/main" val="1228171922"/>
       </p:ext>
     </p:extLst>
   </p:cSld>
@@ -9389,7 +9627,7 @@
           <p:cNvPr id="2" name="Title 1">
             <a:extLst>
               <a:ext uri="{FF2B5EF4-FFF2-40B4-BE49-F238E27FC236}">
-                <a16:creationId xmlns:a16="http://schemas.microsoft.com/office/drawing/2014/main" id="{FD17519F-BBFB-3648-9EDA-603B4675C95D}"/>
+                <a16:creationId xmlns:a16="http://schemas.microsoft.com/office/drawing/2014/main" id="{137F8CFB-5F42-824B-BEB5-B5663AF82629}"/>
               </a:ext>
             </a:extLst>
           </p:cNvPr>
@@ -9402,10 +9640,23 @@
         </p:nvSpPr>
         <p:spPr/>
         <p:txBody>
-          <a:bodyPr/>
-          <a:lstStyle/>
-          <a:p>
-            <a:endParaRPr lang="en-US"/>
+          <a:bodyPr>
+            <a:normAutofit/>
+          </a:bodyPr>
+          <a:lstStyle/>
+          <a:p>
+            <a:r>
+              <a:rPr lang="en-US" dirty="0"/>
+              <a:t>Version Control System Attributes</a:t>
+            </a:r>
+            <a:br>
+              <a:rPr lang="en-US" dirty="0"/>
+            </a:br>
+            <a:r>
+              <a:rPr lang="en-US" sz="2400" dirty="0"/>
+              <a:t>Who do we blame</a:t>
+            </a:r>
+            <a:endParaRPr lang="en-US" dirty="0"/>
           </a:p>
         </p:txBody>
       </p:sp>
@@ -9414,7 +9665,7 @@
           <p:cNvPr id="3" name="Content Placeholder 2">
             <a:extLst>
               <a:ext uri="{FF2B5EF4-FFF2-40B4-BE49-F238E27FC236}">
-                <a16:creationId xmlns:a16="http://schemas.microsoft.com/office/drawing/2014/main" id="{9A368ED5-FA2B-B54A-BA8D-44B2B4798DDB}"/>
+                <a16:creationId xmlns:a16="http://schemas.microsoft.com/office/drawing/2014/main" id="{38F4BFAB-3820-0D4E-84FD-8C5B42BA75CC}"/>
               </a:ext>
             </a:extLst>
           </p:cNvPr>
@@ -9425,71 +9676,59 @@
             <p:ph idx="1"/>
           </p:nvPr>
         </p:nvSpPr>
-        <p:spPr/>
-        <p:txBody>
-          <a:bodyPr>
-            <a:normAutofit/>
-          </a:bodyPr>
-          <a:lstStyle/>
-          <a:p>
-            <a:r>
-              <a:rPr lang="en-US" dirty="0"/>
-              <a:t>Version 1 – Golden works great. Everyone loves it</a:t>
-            </a:r>
-          </a:p>
-          <a:p>
-            <a:r>
-              <a:rPr lang="en-US" dirty="0"/>
-              <a:t>Version 2 – What happened? Old features are broken</a:t>
+        <p:spPr>
+          <a:xfrm>
+            <a:off x="2773599" y="2052116"/>
+            <a:ext cx="7796540" cy="2679904"/>
+          </a:xfrm>
+        </p:spPr>
+        <p:txBody>
+          <a:bodyPr/>
+          <a:lstStyle/>
+          <a:p>
+            <a:r>
+              <a:rPr lang="en-US" dirty="0"/>
+              <a:t>Complete history of every change</a:t>
             </a:r>
           </a:p>
           <a:p>
             <a:pPr lvl="1"/>
             <a:r>
               <a:rPr lang="en-US" dirty="0"/>
-              <a:t>Revert production to Version 1</a:t>
+              <a:t>Who</a:t>
             </a:r>
           </a:p>
           <a:p>
             <a:pPr lvl="1"/>
             <a:r>
               <a:rPr lang="en-US" dirty="0"/>
-              <a:t>Compare the versions</a:t>
+              <a:t>When</a:t>
             </a:r>
           </a:p>
           <a:p>
             <a:pPr lvl="1"/>
             <a:r>
               <a:rPr lang="en-US" dirty="0"/>
-              <a:t>Analyze what changed</a:t>
+              <a:t>What</a:t>
             </a:r>
           </a:p>
           <a:p>
             <a:pPr lvl="1"/>
             <a:r>
               <a:rPr lang="en-US" dirty="0"/>
-              <a:t>Identify ‘Blame’ the contributor</a:t>
+              <a:t>Why</a:t>
             </a:r>
           </a:p>
           <a:p>
             <a:pPr lvl="1"/>
-            <a:r>
-              <a:rPr lang="en-US" dirty="0"/>
-              <a:t>Repair</a:t>
-            </a:r>
-          </a:p>
-          <a:p>
-            <a:r>
-              <a:rPr lang="en-US" dirty="0"/>
-              <a:t>Version 2.1 yay things are better</a:t>
-            </a:r>
+            <a:endParaRPr lang="en-US" dirty="0"/>
           </a:p>
         </p:txBody>
       </p:sp>
     </p:spTree>
     <p:extLst>
       <p:ext uri="{BB962C8B-B14F-4D97-AF65-F5344CB8AC3E}">
-        <p14:creationId xmlns:p14="http://schemas.microsoft.com/office/powerpoint/2010/main" val="3828310215"/>
+        <p14:creationId xmlns:p14="http://schemas.microsoft.com/office/powerpoint/2010/main" val="3352238849"/>
       </p:ext>
     </p:extLst>
   </p:cSld>
@@ -9521,7 +9760,7 @@
           <p:cNvPr id="2" name="Title 1">
             <a:extLst>
               <a:ext uri="{FF2B5EF4-FFF2-40B4-BE49-F238E27FC236}">
-                <a16:creationId xmlns:a16="http://schemas.microsoft.com/office/drawing/2014/main" id="{70693487-6F4A-874A-8E28-93F056EF8EFD}"/>
+                <a16:creationId xmlns:a16="http://schemas.microsoft.com/office/drawing/2014/main" id="{FD17519F-BBFB-3648-9EDA-603B4675C95D}"/>
               </a:ext>
             </a:extLst>
           </p:cNvPr>
@@ -9538,13 +9777,9 @@
           <a:lstStyle/>
           <a:p>
             <a:r>
-              <a:rPr lang="en-US" b="1" dirty="0"/>
-              <a:t>Commit often</a:t>
-            </a:r>
-            <a:br>
-              <a:rPr lang="en-US" dirty="0"/>
-            </a:br>
-            <a:endParaRPr lang="en-US" dirty="0"/>
+              <a:rPr lang="en-US" dirty="0"/>
+              <a:t>Git Life-Cycle</a:t>
+            </a:r>
           </a:p>
         </p:txBody>
       </p:sp>
@@ -9553,7 +9788,7 @@
           <p:cNvPr id="3" name="Content Placeholder 2">
             <a:extLst>
               <a:ext uri="{FF2B5EF4-FFF2-40B4-BE49-F238E27FC236}">
-                <a16:creationId xmlns:a16="http://schemas.microsoft.com/office/drawing/2014/main" id="{2F43B74D-E5A3-7943-B9DF-BE7932FE9144}"/>
+                <a16:creationId xmlns:a16="http://schemas.microsoft.com/office/drawing/2014/main" id="{9A368ED5-FA2B-B54A-BA8D-44B2B4798DDB}"/>
               </a:ext>
             </a:extLst>
           </p:cNvPr>
@@ -9564,40 +9799,63 @@
             <p:ph idx="1"/>
           </p:nvPr>
         </p:nvSpPr>
-        <p:spPr>
-          <a:xfrm>
-            <a:off x="2773599" y="2052116"/>
-            <a:ext cx="7796540" cy="3239974"/>
-          </a:xfrm>
-        </p:spPr>
-        <p:txBody>
-          <a:bodyPr/>
-          <a:lstStyle/>
-          <a:p>
-            <a:pPr lvl="0"/>
-            <a:r>
-              <a:rPr lang="en-US" dirty="0"/>
-              <a:t>Commits are cheap and easy to make. </a:t>
-            </a:r>
-          </a:p>
-          <a:p>
-            <a:pPr lvl="0"/>
-            <a:r>
-              <a:rPr lang="en-US" dirty="0"/>
-              <a:t>They should be made frequently to capture updates to a code base. </a:t>
-            </a:r>
-          </a:p>
-          <a:p>
-            <a:pPr lvl="0"/>
-            <a:r>
-              <a:rPr lang="en-US" dirty="0"/>
-              <a:t>Each commit is a snapshot that the codebase can be reverted to if needed. </a:t>
-            </a:r>
-          </a:p>
-          <a:p>
-            <a:r>
-              <a:rPr lang="en-US" dirty="0"/>
-              <a:t>Frequent commits give many opportunities to revert or undo work. </a:t>
+        <p:spPr/>
+        <p:txBody>
+          <a:bodyPr>
+            <a:normAutofit/>
+          </a:bodyPr>
+          <a:lstStyle/>
+          <a:p>
+            <a:r>
+              <a:rPr lang="en-US" dirty="0"/>
+              <a:t>Version 1 – Golden works great. Everyone loves it</a:t>
+            </a:r>
+          </a:p>
+          <a:p>
+            <a:r>
+              <a:rPr lang="en-US" dirty="0"/>
+              <a:t>Version 2 – What happened? Old features are broken</a:t>
+            </a:r>
+          </a:p>
+          <a:p>
+            <a:pPr lvl="1"/>
+            <a:r>
+              <a:rPr lang="en-US" dirty="0"/>
+              <a:t>Revert production to Version 1</a:t>
+            </a:r>
+          </a:p>
+          <a:p>
+            <a:pPr lvl="1"/>
+            <a:r>
+              <a:rPr lang="en-US" dirty="0"/>
+              <a:t>Compare the versions(</a:t>
+            </a:r>
+          </a:p>
+          <a:p>
+            <a:pPr lvl="1"/>
+            <a:r>
+              <a:rPr lang="en-US" dirty="0"/>
+              <a:t>Analyze what changed</a:t>
+            </a:r>
+          </a:p>
+          <a:p>
+            <a:pPr lvl="1"/>
+            <a:r>
+              <a:rPr lang="en-US" dirty="0"/>
+              <a:t>Identify (Blame) the contributor</a:t>
+            </a:r>
+          </a:p>
+          <a:p>
+            <a:pPr lvl="1"/>
+            <a:r>
+              <a:rPr lang="en-US" dirty="0"/>
+              <a:t>Repair, test, promote</a:t>
+            </a:r>
+          </a:p>
+          <a:p>
+            <a:r>
+              <a:rPr lang="en-US" dirty="0"/>
+              <a:t>Version 2.1 yay! things are better</a:t>
             </a:r>
           </a:p>
         </p:txBody>
@@ -9605,7 +9863,7 @@
     </p:spTree>
     <p:extLst>
       <p:ext uri="{BB962C8B-B14F-4D97-AF65-F5344CB8AC3E}">
-        <p14:creationId xmlns:p14="http://schemas.microsoft.com/office/powerpoint/2010/main" val="1036139159"/>
+        <p14:creationId xmlns:p14="http://schemas.microsoft.com/office/powerpoint/2010/main" val="3828310215"/>
       </p:ext>
     </p:extLst>
   </p:cSld>
@@ -9637,7 +9895,7 @@
           <p:cNvPr id="2" name="Title 1">
             <a:extLst>
               <a:ext uri="{FF2B5EF4-FFF2-40B4-BE49-F238E27FC236}">
-                <a16:creationId xmlns:a16="http://schemas.microsoft.com/office/drawing/2014/main" id="{804CC23C-B918-2C40-99F1-D640E26113DF}"/>
+                <a16:creationId xmlns:a16="http://schemas.microsoft.com/office/drawing/2014/main" id="{70693487-6F4A-874A-8E28-93F056EF8EFD}"/>
               </a:ext>
             </a:extLst>
           </p:cNvPr>
@@ -9650,14 +9908,12 @@
         </p:nvSpPr>
         <p:spPr/>
         <p:txBody>
-          <a:bodyPr>
-            <a:normAutofit fontScale="90000"/>
-          </a:bodyPr>
-          <a:lstStyle/>
-          <a:p>
-            <a:r>
-              <a:rPr lang="en-US" dirty="0"/>
-              <a:t>Ensure you're working from latest version</a:t>
+          <a:bodyPr/>
+          <a:lstStyle/>
+          <a:p>
+            <a:r>
+              <a:rPr lang="en-US" b="1" dirty="0"/>
+              <a:t>Commit often</a:t>
             </a:r>
             <a:br>
               <a:rPr lang="en-US" dirty="0"/>
@@ -9671,7 +9927,7 @@
           <p:cNvPr id="3" name="Content Placeholder 2">
             <a:extLst>
               <a:ext uri="{FF2B5EF4-FFF2-40B4-BE49-F238E27FC236}">
-                <a16:creationId xmlns:a16="http://schemas.microsoft.com/office/drawing/2014/main" id="{8B5E3C1F-87F7-934A-ABB0-E378A379DD79}"/>
+                <a16:creationId xmlns:a16="http://schemas.microsoft.com/office/drawing/2014/main" id="{2F43B74D-E5A3-7943-B9DF-BE7932FE9144}"/>
               </a:ext>
             </a:extLst>
           </p:cNvPr>
@@ -9685,71 +9941,45 @@
         <p:spPr>
           <a:xfrm>
             <a:off x="2773599" y="2052116"/>
-            <a:ext cx="7796540" cy="1639774"/>
+            <a:ext cx="7796540" cy="3239974"/>
           </a:xfrm>
         </p:spPr>
         <p:txBody>
           <a:bodyPr/>
           <a:lstStyle/>
           <a:p>
-            <a:pPr marL="342900" lvl="0" indent="-342900">
-              <a:spcBef>
-                <a:spcPts val="0"/>
-              </a:spcBef>
-            </a:pPr>
-            <a:r>
-              <a:rPr lang="en-US" dirty="0"/>
-              <a:t>It’s easy to have a local copy of the codebase fall behind the global copy. Make sure to </a:t>
-            </a:r>
-            <a:r>
-              <a:rPr lang="en-US" dirty="0">
-                <a:solidFill>
-                  <a:srgbClr val="FF0000"/>
-                </a:solidFill>
-                <a:hlinkClick r:id="rId2">
-                  <a:extLst>
-                    <a:ext uri="{A12FA001-AC4F-418D-AE19-62706E023703}">
-                      <ahyp:hlinkClr xmlns:ahyp="http://schemas.microsoft.com/office/drawing/2018/hyperlinkcolor" val="tx"/>
-                    </a:ext>
-                  </a:extLst>
-                </a:hlinkClick>
-              </a:rPr>
-              <a:t>git pull</a:t>
-            </a:r>
-            <a:r>
-              <a:rPr lang="en-US" dirty="0">
-                <a:solidFill>
-                  <a:srgbClr val="FF0000"/>
-                </a:solidFill>
-              </a:rPr>
-              <a:t> </a:t>
-            </a:r>
-            <a:r>
-              <a:rPr lang="en-US" dirty="0"/>
-              <a:t>or </a:t>
-            </a:r>
-            <a:r>
-              <a:rPr lang="en-US" dirty="0">
-                <a:solidFill>
-                  <a:srgbClr val="FF0000"/>
-                </a:solidFill>
-              </a:rPr>
-              <a:t>fetch</a:t>
-            </a:r>
-            <a:r>
-              <a:rPr lang="en-US" dirty="0"/>
-              <a:t> the latest code before making updates. This will help avoid conflicts at merge time.</a:t>
-            </a:r>
-          </a:p>
-          <a:p>
-            <a:endParaRPr lang="en-US" dirty="0"/>
+            <a:pPr lvl="0"/>
+            <a:r>
+              <a:rPr lang="en-US" dirty="0"/>
+              <a:t>Commits are cheap and easy to make. </a:t>
+            </a:r>
+          </a:p>
+          <a:p>
+            <a:pPr lvl="0"/>
+            <a:r>
+              <a:rPr lang="en-US" dirty="0"/>
+              <a:t>Make frequently to capture updates to a code base. </a:t>
+            </a:r>
+          </a:p>
+          <a:p>
+            <a:pPr lvl="0"/>
+            <a:r>
+              <a:rPr lang="en-US" dirty="0"/>
+              <a:t>Each commit is a snapshot that the codebase can be reverted to if needed. </a:t>
+            </a:r>
+          </a:p>
+          <a:p>
+            <a:r>
+              <a:rPr lang="en-US" dirty="0"/>
+              <a:t>Frequent commits give many opportunities to revert or undo work. You have few changes to evaluate when something goes bad between commits  </a:t>
+            </a:r>
           </a:p>
         </p:txBody>
       </p:sp>
     </p:spTree>
     <p:extLst>
       <p:ext uri="{BB962C8B-B14F-4D97-AF65-F5344CB8AC3E}">
-        <p14:creationId xmlns:p14="http://schemas.microsoft.com/office/powerpoint/2010/main" val="4005328607"/>
+        <p14:creationId xmlns:p14="http://schemas.microsoft.com/office/powerpoint/2010/main" val="1036139159"/>
       </p:ext>
     </p:extLst>
   </p:cSld>

</xml_diff>

<commit_message>
first week updates to slides
</commit_message>
<xml_diff>
--- a/Week 02 - git.pptx
+++ b/Week 02 - git.pptx
@@ -235,7 +235,7 @@
           <a:p>
             <a:fld id="{0598D9CF-EA6B-724A-9C03-620689487A2C}" type="datetimeFigureOut">
               <a:rPr lang="en-US" smtClean="0"/>
-              <a:t>7/30/22</a:t>
+              <a:t>8/26/22</a:t>
             </a:fld>
             <a:endParaRPr lang="en-US"/>
           </a:p>
@@ -803,7 +803,7 @@
           <a:p>
             <a:fld id="{9AB3A824-1A51-4B26-AD58-A6D8E14F6C04}" type="datetimeFigureOut">
               <a:rPr lang="en-US" dirty="0"/>
-              <a:t>7/30/22</a:t>
+              <a:t>8/26/22</a:t>
             </a:fld>
             <a:endParaRPr lang="en-US" dirty="0"/>
           </a:p>
@@ -1137,7 +1137,7 @@
           <a:p>
             <a:fld id="{D857E33E-8B18-4087-B112-809917729534}" type="datetimeFigureOut">
               <a:rPr lang="en-US" dirty="0"/>
-              <a:t>7/30/22</a:t>
+              <a:t>8/26/22</a:t>
             </a:fld>
             <a:endParaRPr lang="en-US" dirty="0"/>
           </a:p>
@@ -1439,7 +1439,7 @@
           <a:p>
             <a:fld id="{D3FFE419-2371-464F-8239-3959401C3561}" type="datetimeFigureOut">
               <a:rPr lang="en-US" dirty="0"/>
-              <a:t>7/30/22</a:t>
+              <a:t>8/26/22</a:t>
             </a:fld>
             <a:endParaRPr lang="en-US" dirty="0"/>
           </a:p>
@@ -1686,7 +1686,7 @@
           <a:p>
             <a:fld id="{97D162C4-EDD9-4389-A98B-B87ECEA2A816}" type="datetimeFigureOut">
               <a:rPr lang="en-US" dirty="0"/>
-              <a:t>7/30/22</a:t>
+              <a:t>8/26/22</a:t>
             </a:fld>
             <a:endParaRPr lang="en-US" dirty="0"/>
           </a:p>
@@ -2093,7 +2093,7 @@
           <a:p>
             <a:fld id="{3E5059C3-6A89-4494-99FF-5A4D6FFD50EB}" type="datetimeFigureOut">
               <a:rPr lang="en-US" dirty="0"/>
-              <a:t>7/30/22</a:t>
+              <a:t>8/26/22</a:t>
             </a:fld>
             <a:endParaRPr lang="en-US" dirty="0"/>
           </a:p>
@@ -2407,7 +2407,7 @@
           <a:p>
             <a:fld id="{CA954B2F-12DE-47F5-8894-472B206D2E1E}" type="datetimeFigureOut">
               <a:rPr lang="en-US" dirty="0"/>
-              <a:t>7/30/22</a:t>
+              <a:t>8/26/22</a:t>
             </a:fld>
             <a:endParaRPr lang="en-US" dirty="0"/>
           </a:p>
@@ -2951,7 +2951,7 @@
           <a:p>
             <a:fld id="{3F30E46F-7819-4ACF-B48B-48222C2ACC88}" type="datetimeFigureOut">
               <a:rPr lang="en-US" dirty="0"/>
-              <a:t>7/30/22</a:t>
+              <a:t>8/26/22</a:t>
             </a:fld>
             <a:endParaRPr lang="en-US" dirty="0"/>
           </a:p>
@@ -3146,7 +3146,7 @@
           <a:p>
             <a:fld id="{1FAF3416-4057-4DAA-829D-4CA07428D088}" type="datetimeFigureOut">
               <a:rPr lang="en-US" dirty="0"/>
-              <a:t>7/30/22</a:t>
+              <a:t>8/26/22</a:t>
             </a:fld>
             <a:endParaRPr lang="en-US" dirty="0"/>
           </a:p>
@@ -3359,7 +3359,7 @@
           <a:p>
             <a:fld id="{921D9284-D300-4297-87F7-E791DCC15DB1}" type="datetimeFigureOut">
               <a:rPr lang="en-US" dirty="0"/>
-              <a:t>7/30/22</a:t>
+              <a:t>8/26/22</a:t>
             </a:fld>
             <a:endParaRPr lang="en-US" dirty="0"/>
           </a:p>
@@ -3728,7 +3728,7 @@
           <a:p>
             <a:fld id="{37D525BB-DA17-4BA0-B3C8-3AC3ABC827E6}" type="datetimeFigureOut">
               <a:rPr lang="en-US" dirty="0"/>
-              <a:t>7/30/22</a:t>
+              <a:t>8/26/22</a:t>
             </a:fld>
             <a:endParaRPr lang="en-US" dirty="0"/>
           </a:p>
@@ -4131,7 +4131,7 @@
           <a:p>
             <a:fld id="{B16C4C9A-3960-41CF-A4E9-2A8FB932454B}" type="datetimeFigureOut">
               <a:rPr lang="en-US" dirty="0"/>
-              <a:t>7/30/22</a:t>
+              <a:t>8/26/22</a:t>
             </a:fld>
             <a:endParaRPr lang="en-US" dirty="0"/>
           </a:p>
@@ -4442,7 +4442,7 @@
           <a:p>
             <a:fld id="{3CBC1C18-307B-4F68-A007-B5B542270E8D}" type="datetimeFigureOut">
               <a:rPr lang="en-US" dirty="0"/>
-              <a:t>7/30/22</a:t>
+              <a:t>8/26/22</a:t>
             </a:fld>
             <a:endParaRPr lang="en-US" dirty="0"/>
           </a:p>
@@ -5394,14 +5394,29 @@
             <a:pPr lvl="0"/>
             <a:r>
               <a:rPr lang="en-US" dirty="0"/>
-              <a:t>It is important to leave descriptive explanatory commit log messages. These commit log messages should explain the “why” and “what” that encompass the commits content. </a:t>
+              <a:t>It is important to leave descriptive commit log messages. The messages should explain the “why” and “what” of the commit</a:t>
             </a:r>
           </a:p>
           <a:p>
             <a:pPr lvl="0"/>
             <a:r>
               <a:rPr lang="en-US" dirty="0"/>
-              <a:t>These log messages become the canonical history of the project’s development and leave a trail for future contributors to review.</a:t>
+              <a:t>Log messages become the </a:t>
+            </a:r>
+            <a:r>
+              <a:rPr lang="en-US" dirty="0">
+                <a:solidFill>
+                  <a:schemeClr val="accent2">
+                    <a:lumMod val="60000"/>
+                    <a:lumOff val="40000"/>
+                  </a:schemeClr>
+                </a:solidFill>
+              </a:rPr>
+              <a:t>canonical</a:t>
+            </a:r>
+            <a:r>
+              <a:rPr lang="en-US" dirty="0"/>
+              <a:t> history of the project’s development and leave a trail for future contributors to review.</a:t>
             </a:r>
           </a:p>
           <a:p>
@@ -5615,14 +5630,14 @@
             <a:pPr lvl="0"/>
             <a:r>
               <a:rPr lang="en-US" dirty="0"/>
-              <a:t>Branching is a powerful mechanism that allows developers to create a separate line of development. </a:t>
+              <a:t>Creates a separate line of development. </a:t>
             </a:r>
           </a:p>
           <a:p>
             <a:pPr lvl="0"/>
             <a:r>
               <a:rPr lang="en-US" dirty="0"/>
-              <a:t>Branches should be used frequently as they are quick and inexpensive. </a:t>
+              <a:t>Should be used frequently as they are quick and inexpensive. </a:t>
             </a:r>
           </a:p>
           <a:p>
@@ -6287,7 +6302,7 @@
           <a:p>
             <a:r>
               <a:rPr lang="en-US" dirty="0"/>
-              <a:t>git add . Or names of files</a:t>
+              <a:t>git add . 		Or names of files</a:t>
             </a:r>
           </a:p>
           <a:p>
@@ -7572,7 +7587,7 @@
           <a:p>
             <a:r>
               <a:rPr lang="en-US" dirty="0"/>
-              <a:t>git diff	 there we see the diff</a:t>
+              <a:t>git diff	there we see the diff</a:t>
             </a:r>
           </a:p>
           <a:p>
@@ -8039,7 +8054,7 @@
             </a:r>
             <a:r>
               <a:rPr lang="en-US" dirty="0" err="1"/>
-              <a:t>github</a:t>
+              <a:t>github.com</a:t>
             </a:r>
             <a:endParaRPr lang="en-US" dirty="0"/>
           </a:p>
@@ -8607,7 +8622,7 @@
             </a:r>
             <a:r>
               <a:rPr lang="en-US" dirty="0"/>
-              <a:t> –b </a:t>
+              <a:t> -b </a:t>
             </a:r>
             <a:r>
               <a:rPr lang="en-US" dirty="0">
@@ -8683,7 +8698,7 @@
             </a:r>
             <a:r>
               <a:rPr lang="en-US" dirty="0"/>
-              <a:t> –m ”I’m happy with the change”</a:t>
+              <a:t> -m ”I’m happy with the change”</a:t>
             </a:r>
           </a:p>
           <a:p>
@@ -8692,7 +8707,7 @@
               <a:t>git </a:t>
             </a:r>
             <a:r>
-              <a:rPr lang="en-US" dirty="0">
+              <a:rPr lang="en-US">
                 <a:solidFill>
                   <a:schemeClr val="tx2">
                     <a:lumMod val="75000"/>
@@ -8702,8 +8717,12 @@
               <a:t>checkout</a:t>
             </a:r>
             <a:r>
-              <a:rPr lang="en-US" dirty="0"/>
-              <a:t> master		//  how we change branches</a:t>
+              <a:rPr lang="en-US"/>
+              <a:t> main</a:t>
+            </a:r>
+            <a:r>
+              <a:rPr lang="en-US" dirty="0"/>
+              <a:t>		//  how we change branches</a:t>
             </a:r>
           </a:p>
           <a:p>

</xml_diff>